<commit_message>
Updates Poster (spelling etc)
</commit_message>
<xml_diff>
--- a/poster/Poster.pptx
+++ b/poster/Poster.pptx
@@ -3928,7 +3928,7 @@
               <a:rPr lang="en-US" dirty="0">
                 <a:latin typeface="Georgia" panose="02040502050405020303" pitchFamily="18" charset="0"/>
               </a:rPr>
-              <a:t> X-as Y-as </a:t>
+              <a:t> X-as, Y-as </a:t>
             </a:r>
             <a:r>
               <a:rPr lang="en-US" dirty="0" err="1">
@@ -4499,10 +4499,16 @@
               <a:buChar char="•"/>
             </a:pPr>
             <a:r>
+              <a:rPr lang="en-US" dirty="0" err="1">
+                <a:latin typeface="Georgia" panose="02040502050405020303" pitchFamily="18" charset="0"/>
+              </a:rPr>
+              <a:t>Heeft</a:t>
+            </a:r>
+            <a:r>
               <a:rPr lang="en-US" dirty="0">
                 <a:latin typeface="Georgia" panose="02040502050405020303" pitchFamily="18" charset="0"/>
               </a:rPr>
-              <a:t>De </a:t>
+              <a:t> de </a:t>
             </a:r>
             <a:r>
               <a:rPr lang="en-US" dirty="0" err="1">
@@ -4526,13 +4532,25 @@
               <a:rPr lang="en-US" dirty="0">
                 <a:latin typeface="Georgia" panose="02040502050405020303" pitchFamily="18" charset="0"/>
               </a:rPr>
-              <a:t> =&gt; </a:t>
+              <a:t> → </a:t>
             </a:r>
             <a:r>
               <a:rPr lang="en-US" dirty="0" err="1">
                 <a:latin typeface="Georgia" panose="02040502050405020303" pitchFamily="18" charset="0"/>
               </a:rPr>
-              <a:t>Kostelijk</a:t>
+              <a:t>zeer</a:t>
+            </a:r>
+            <a:r>
+              <a:rPr lang="en-US" dirty="0">
+                <a:latin typeface="Georgia" panose="02040502050405020303" pitchFamily="18" charset="0"/>
+              </a:rPr>
+              <a:t> </a:t>
+            </a:r>
+            <a:r>
+              <a:rPr lang="en-US" dirty="0" err="1">
+                <a:latin typeface="Georgia" panose="02040502050405020303" pitchFamily="18" charset="0"/>
+              </a:rPr>
+              <a:t>kostelijk</a:t>
             </a:r>
             <a:endParaRPr lang="en-US" dirty="0">
               <a:latin typeface="Georgia" panose="02040502050405020303" pitchFamily="18" charset="0"/>
@@ -4662,15 +4680,33 @@
               <a:buChar char="•"/>
             </a:pPr>
             <a:r>
+              <a:rPr lang="en-US" dirty="0" err="1">
+                <a:latin typeface="Georgia" panose="02040502050405020303" pitchFamily="18" charset="0"/>
+              </a:rPr>
+              <a:t>Heeft</a:t>
+            </a:r>
+            <a:r>
               <a:rPr lang="en-US" dirty="0">
                 <a:latin typeface="Georgia" panose="02040502050405020303" pitchFamily="18" charset="0"/>
               </a:rPr>
-              <a:t>‘Klein’ </a:t>
+              <a:t> maar </a:t>
             </a:r>
             <a:r>
               <a:rPr lang="en-US" dirty="0" err="1">
                 <a:latin typeface="Georgia" panose="02040502050405020303" pitchFamily="18" charset="0"/>
               </a:rPr>
+              <a:t>een</a:t>
+            </a:r>
+            <a:r>
+              <a:rPr lang="en-US" dirty="0">
+                <a:latin typeface="Georgia" panose="02040502050405020303" pitchFamily="18" charset="0"/>
+              </a:rPr>
+              <a:t> </a:t>
+            </a:r>
+            <a:r>
+              <a:rPr lang="en-US" dirty="0" err="1">
+                <a:latin typeface="Georgia" panose="02040502050405020303" pitchFamily="18" charset="0"/>
+              </a:rPr>
               <a:t>deel</a:t>
             </a:r>
             <a:r>
@@ -4684,6 +4720,36 @@
                 <a:latin typeface="Georgia" panose="02040502050405020303" pitchFamily="18" charset="0"/>
               </a:rPr>
               <a:t>nodig</a:t>
+            </a:r>
+            <a:r>
+              <a:rPr lang="en-US" dirty="0">
+                <a:latin typeface="Georgia" panose="02040502050405020303" pitchFamily="18" charset="0"/>
+              </a:rPr>
+              <a:t> </a:t>
+            </a:r>
+            <a:r>
+              <a:rPr lang="en-US" dirty="0">
+                <a:latin typeface="Georgia Pro Cond Semibold" panose="02040706050405020303" pitchFamily="18" charset="0"/>
+              </a:rPr>
+              <a:t>→ </a:t>
+            </a:r>
+            <a:r>
+              <a:rPr lang="en-US" dirty="0" err="1">
+                <a:latin typeface="Georgia" panose="02040502050405020303" pitchFamily="18" charset="0"/>
+              </a:rPr>
+              <a:t>zeer</a:t>
+            </a:r>
+            <a:r>
+              <a:rPr lang="en-US" dirty="0">
+                <a:latin typeface="Georgia" panose="02040502050405020303" pitchFamily="18" charset="0"/>
+              </a:rPr>
+              <a:t> </a:t>
+            </a:r>
+            <a:r>
+              <a:rPr lang="en-US" dirty="0" err="1">
+                <a:latin typeface="Georgia" panose="02040502050405020303" pitchFamily="18" charset="0"/>
+              </a:rPr>
+              <a:t>efficiënt</a:t>
             </a:r>
             <a:endParaRPr lang="en-US" dirty="0">
               <a:latin typeface="Georgia" panose="02040502050405020303" pitchFamily="18" charset="0"/>
@@ -4723,7 +4789,7 @@
               <a:rPr lang="en-US" dirty="0" err="1">
                 <a:latin typeface="Georgia" panose="02040502050405020303" pitchFamily="18" charset="0"/>
               </a:rPr>
-              <a:t>Kostelijk</a:t>
+              <a:t>Kostelijker</a:t>
             </a:r>
             <a:endParaRPr lang="en-US" dirty="0">
               <a:latin typeface="Georgia" panose="02040502050405020303" pitchFamily="18" charset="0"/>
@@ -8640,7 +8706,7 @@
               <a:rPr lang="en-US" sz="1400" dirty="0" err="1">
                 <a:latin typeface="Georgia" panose="02040502050405020303" pitchFamily="18" charset="0"/>
               </a:rPr>
-              <a:t>betekent</a:t>
+              <a:t>staat</a:t>
             </a:r>
             <a:r>
               <a:rPr lang="en-US" sz="1400" dirty="0">
@@ -8652,13 +8718,13 @@
               <a:rPr lang="en-US" sz="1400" dirty="0" err="1">
                 <a:latin typeface="Georgia" panose="02040502050405020303" pitchFamily="18" charset="0"/>
               </a:rPr>
-              <a:t>dat</a:t>
+              <a:t>voor</a:t>
             </a:r>
             <a:r>
               <a:rPr lang="en-US" sz="1400" dirty="0">
                 <a:latin typeface="Georgia" panose="02040502050405020303" pitchFamily="18" charset="0"/>
               </a:rPr>
-              <a:t> we de </a:t>
+              <a:t> de </a:t>
             </a:r>
             <a:r>
               <a:rPr lang="en-US" sz="1400" dirty="0" err="1">
@@ -8676,19 +8742,7 @@
               <a:rPr lang="en-US" sz="1400" dirty="0" err="1">
                 <a:latin typeface="Georgia" panose="02040502050405020303" pitchFamily="18" charset="0"/>
               </a:rPr>
-              <a:t>hebben</a:t>
-            </a:r>
-            <a:r>
-              <a:rPr lang="en-US" sz="1400" dirty="0">
-                <a:latin typeface="Georgia" panose="02040502050405020303" pitchFamily="18" charset="0"/>
-              </a:rPr>
-              <a:t> </a:t>
-            </a:r>
-            <a:r>
-              <a:rPr lang="en-US" sz="1400" dirty="0" err="1">
-                <a:latin typeface="Georgia" panose="02040502050405020303" pitchFamily="18" charset="0"/>
-              </a:rPr>
-              <a:t>berekent</a:t>
+              <a:t>berekenen</a:t>
             </a:r>
             <a:r>
               <a:rPr lang="en-US" sz="1400" dirty="0">
@@ -8712,64 +8766,58 @@
               <a:buChar char="•"/>
             </a:pPr>
             <a:r>
+              <a:rPr lang="en-US" sz="1400" dirty="0" err="1">
+                <a:latin typeface="Georgia" panose="02040502050405020303" pitchFamily="18" charset="0"/>
+              </a:rPr>
+              <a:t>Een</a:t>
+            </a:r>
+            <a:r>
               <a:rPr lang="en-US" sz="1400" dirty="0">
                 <a:latin typeface="Georgia" panose="02040502050405020303" pitchFamily="18" charset="0"/>
               </a:rPr>
-              <a:t>We </a:t>
+              <a:t> </a:t>
             </a:r>
             <a:r>
               <a:rPr lang="en-US" sz="1400" dirty="0" err="1">
                 <a:latin typeface="Georgia" panose="02040502050405020303" pitchFamily="18" charset="0"/>
               </a:rPr>
-              <a:t>willen</a:t>
+              <a:t>methode</a:t>
             </a:r>
             <a:r>
               <a:rPr lang="en-US" sz="1400" dirty="0">
                 <a:latin typeface="Georgia" panose="02040502050405020303" pitchFamily="18" charset="0"/>
               </a:rPr>
-              <a:t> </a:t>
+              <a:t> in de linker </a:t>
             </a:r>
             <a:r>
               <a:rPr lang="en-US" sz="1400" dirty="0" err="1">
                 <a:latin typeface="Georgia" panose="02040502050405020303" pitchFamily="18" charset="0"/>
               </a:rPr>
-              <a:t>een</a:t>
+              <a:t>onderhoek</a:t>
             </a:r>
             <a:r>
               <a:rPr lang="en-US" sz="1400" dirty="0">
                 <a:latin typeface="Georgia" panose="02040502050405020303" pitchFamily="18" charset="0"/>
               </a:rPr>
-              <a:t> </a:t>
+              <a:t> is </a:t>
             </a:r>
             <a:r>
               <a:rPr lang="en-US" sz="1400" dirty="0" err="1">
                 <a:latin typeface="Georgia" panose="02040502050405020303" pitchFamily="18" charset="0"/>
               </a:rPr>
-              <a:t>methode</a:t>
+              <a:t>theoretisch</a:t>
             </a:r>
             <a:r>
               <a:rPr lang="en-US" sz="1400" dirty="0">
                 <a:latin typeface="Georgia" panose="02040502050405020303" pitchFamily="18" charset="0"/>
               </a:rPr>
-              <a:t> die in de linker </a:t>
+              <a:t> </a:t>
             </a:r>
             <a:r>
               <a:rPr lang="en-US" sz="1400" dirty="0" err="1">
                 <a:latin typeface="Georgia" panose="02040502050405020303" pitchFamily="18" charset="0"/>
               </a:rPr>
-              <a:t>onderhoek</a:t>
-            </a:r>
-            <a:r>
-              <a:rPr lang="en-US" sz="1400" dirty="0">
-                <a:latin typeface="Georgia" panose="02040502050405020303" pitchFamily="18" charset="0"/>
-              </a:rPr>
-              <a:t> </a:t>
-            </a:r>
-            <a:r>
-              <a:rPr lang="en-US" sz="1400" dirty="0" err="1">
-                <a:latin typeface="Georgia" panose="02040502050405020303" pitchFamily="18" charset="0"/>
-              </a:rPr>
-              <a:t>ligt</a:t>
+              <a:t>ideaal</a:t>
             </a:r>
             <a:r>
               <a:rPr lang="en-US" sz="1400" dirty="0">

</xml_diff>

<commit_message>
Update counting rel DTW in poster figure
</commit_message>
<xml_diff>
--- a/poster/Poster.pptx
+++ b/poster/Poster.pptx
@@ -9149,10 +9149,10 @@
       </p:pic>
       <p:pic>
         <p:nvPicPr>
-          <p:cNvPr id="37" name="Graphic 36">
+          <p:cNvPr id="56" name="Graphic 55">
             <a:extLst>
               <a:ext uri="{FF2B5EF4-FFF2-40B4-BE49-F238E27FC236}">
-                <a16:creationId xmlns:a16="http://schemas.microsoft.com/office/drawing/2014/main" id="{51869EA7-8EA9-AD39-D8A5-27609E304D24}"/>
+                <a16:creationId xmlns:a16="http://schemas.microsoft.com/office/drawing/2014/main" id="{124AD95A-D127-DFD7-DB11-7B2524A13C18}"/>
               </a:ext>
             </a:extLst>
           </p:cNvPr>
@@ -9169,45 +9169,6 @@
               </a:ext>
               <a:ext uri="{96DAC541-7B7A-43D3-8B79-37D633B846F1}">
                 <asvg:svgBlip xmlns:asvg="http://schemas.microsoft.com/office/drawing/2016/SVG/main" r:embed="rId15"/>
-              </a:ext>
-            </a:extLst>
-          </a:blip>
-          <a:stretch>
-            <a:fillRect/>
-          </a:stretch>
-        </p:blipFill>
-        <p:spPr>
-          <a:xfrm>
-            <a:off x="20227572" y="6950269"/>
-            <a:ext cx="6062775" cy="3537507"/>
-          </a:xfrm>
-          <a:prstGeom prst="rect">
-            <a:avLst/>
-          </a:prstGeom>
-        </p:spPr>
-      </p:pic>
-      <p:pic>
-        <p:nvPicPr>
-          <p:cNvPr id="56" name="Graphic 55">
-            <a:extLst>
-              <a:ext uri="{FF2B5EF4-FFF2-40B4-BE49-F238E27FC236}">
-                <a16:creationId xmlns:a16="http://schemas.microsoft.com/office/drawing/2014/main" id="{124AD95A-D127-DFD7-DB11-7B2524A13C18}"/>
-              </a:ext>
-            </a:extLst>
-          </p:cNvPr>
-          <p:cNvPicPr>
-            <a:picLocks noChangeAspect="1"/>
-          </p:cNvPicPr>
-          <p:nvPr/>
-        </p:nvPicPr>
-        <p:blipFill>
-          <a:blip r:embed="rId16">
-            <a:extLst>
-              <a:ext uri="{28A0092B-C50C-407E-A947-70E740481C1C}">
-                <a14:useLocalDpi xmlns:a14="http://schemas.microsoft.com/office/drawing/2010/main" val="0"/>
-              </a:ext>
-              <a:ext uri="{96DAC541-7B7A-43D3-8B79-37D633B846F1}">
-                <asvg:svgBlip xmlns:asvg="http://schemas.microsoft.com/office/drawing/2016/SVG/main" r:embed="rId17"/>
               </a:ext>
             </a:extLst>
           </a:blip>
@@ -9240,6 +9201,45 @@
           <p:nvPr/>
         </p:nvPicPr>
         <p:blipFill>
+          <a:blip r:embed="rId16">
+            <a:extLst>
+              <a:ext uri="{28A0092B-C50C-407E-A947-70E740481C1C}">
+                <a14:useLocalDpi xmlns:a14="http://schemas.microsoft.com/office/drawing/2010/main" val="0"/>
+              </a:ext>
+              <a:ext uri="{96DAC541-7B7A-43D3-8B79-37D633B846F1}">
+                <asvg:svgBlip xmlns:asvg="http://schemas.microsoft.com/office/drawing/2016/SVG/main" r:embed="rId17"/>
+              </a:ext>
+            </a:extLst>
+          </a:blip>
+          <a:stretch>
+            <a:fillRect/>
+          </a:stretch>
+        </p:blipFill>
+        <p:spPr>
+          <a:xfrm>
+            <a:off x="20303897" y="15993878"/>
+            <a:ext cx="4803431" cy="3599680"/>
+          </a:xfrm>
+          <a:prstGeom prst="rect">
+            <a:avLst/>
+          </a:prstGeom>
+        </p:spPr>
+      </p:pic>
+      <p:pic>
+        <p:nvPicPr>
+          <p:cNvPr id="67" name="Graphic 66">
+            <a:extLst>
+              <a:ext uri="{FF2B5EF4-FFF2-40B4-BE49-F238E27FC236}">
+                <a16:creationId xmlns:a16="http://schemas.microsoft.com/office/drawing/2014/main" id="{57BDBFE8-DA5A-C56D-2E00-3EF365C354FB}"/>
+              </a:ext>
+            </a:extLst>
+          </p:cNvPr>
+          <p:cNvPicPr>
+            <a:picLocks noChangeAspect="1"/>
+          </p:cNvPicPr>
+          <p:nvPr/>
+        </p:nvPicPr>
+        <p:blipFill>
           <a:blip r:embed="rId18">
             <a:extLst>
               <a:ext uri="{28A0092B-C50C-407E-A947-70E740481C1C}">
@@ -9256,8 +9256,8 @@
         </p:blipFill>
         <p:spPr>
           <a:xfrm>
-            <a:off x="20303897" y="15993878"/>
-            <a:ext cx="4803431" cy="3599680"/>
+            <a:off x="20227572" y="6936497"/>
+            <a:ext cx="6075067" cy="3544679"/>
           </a:xfrm>
           <a:prstGeom prst="rect">
             <a:avLst/>

</xml_diff>

<commit_message>
Poster changes after feedback
</commit_message>
<xml_diff>
--- a/poster/Poster.pptx
+++ b/poster/Poster.pptx
@@ -243,7 +243,7 @@
           <a:p>
             <a:fld id="{91AE326B-1E28-4C22-A3D1-EDFB78E65B5C}" type="datetimeFigureOut">
               <a:rPr lang="LID4096" smtClean="0"/>
-              <a:t>03/03/2024</a:t>
+              <a:t>03/04/2024</a:t>
             </a:fld>
             <a:endParaRPr lang="LID4096"/>
           </a:p>
@@ -413,7 +413,7 @@
           <a:p>
             <a:fld id="{91AE326B-1E28-4C22-A3D1-EDFB78E65B5C}" type="datetimeFigureOut">
               <a:rPr lang="LID4096" smtClean="0"/>
-              <a:t>03/03/2024</a:t>
+              <a:t>03/04/2024</a:t>
             </a:fld>
             <a:endParaRPr lang="LID4096"/>
           </a:p>
@@ -593,7 +593,7 @@
           <a:p>
             <a:fld id="{91AE326B-1E28-4C22-A3D1-EDFB78E65B5C}" type="datetimeFigureOut">
               <a:rPr lang="LID4096" smtClean="0"/>
-              <a:t>03/03/2024</a:t>
+              <a:t>03/04/2024</a:t>
             </a:fld>
             <a:endParaRPr lang="LID4096"/>
           </a:p>
@@ -763,7 +763,7 @@
           <a:p>
             <a:fld id="{91AE326B-1E28-4C22-A3D1-EDFB78E65B5C}" type="datetimeFigureOut">
               <a:rPr lang="LID4096" smtClean="0"/>
-              <a:t>03/03/2024</a:t>
+              <a:t>03/04/2024</a:t>
             </a:fld>
             <a:endParaRPr lang="LID4096"/>
           </a:p>
@@ -1007,7 +1007,7 @@
           <a:p>
             <a:fld id="{91AE326B-1E28-4C22-A3D1-EDFB78E65B5C}" type="datetimeFigureOut">
               <a:rPr lang="LID4096" smtClean="0"/>
-              <a:t>03/03/2024</a:t>
+              <a:t>03/04/2024</a:t>
             </a:fld>
             <a:endParaRPr lang="LID4096"/>
           </a:p>
@@ -1239,7 +1239,7 @@
           <a:p>
             <a:fld id="{91AE326B-1E28-4C22-A3D1-EDFB78E65B5C}" type="datetimeFigureOut">
               <a:rPr lang="LID4096" smtClean="0"/>
-              <a:t>03/03/2024</a:t>
+              <a:t>03/04/2024</a:t>
             </a:fld>
             <a:endParaRPr lang="LID4096"/>
           </a:p>
@@ -1606,7 +1606,7 @@
           <a:p>
             <a:fld id="{91AE326B-1E28-4C22-A3D1-EDFB78E65B5C}" type="datetimeFigureOut">
               <a:rPr lang="LID4096" smtClean="0"/>
-              <a:t>03/03/2024</a:t>
+              <a:t>03/04/2024</a:t>
             </a:fld>
             <a:endParaRPr lang="LID4096"/>
           </a:p>
@@ -1724,7 +1724,7 @@
           <a:p>
             <a:fld id="{91AE326B-1E28-4C22-A3D1-EDFB78E65B5C}" type="datetimeFigureOut">
               <a:rPr lang="LID4096" smtClean="0"/>
-              <a:t>03/03/2024</a:t>
+              <a:t>03/04/2024</a:t>
             </a:fld>
             <a:endParaRPr lang="LID4096"/>
           </a:p>
@@ -1819,7 +1819,7 @@
           <a:p>
             <a:fld id="{91AE326B-1E28-4C22-A3D1-EDFB78E65B5C}" type="datetimeFigureOut">
               <a:rPr lang="LID4096" smtClean="0"/>
-              <a:t>03/03/2024</a:t>
+              <a:t>03/04/2024</a:t>
             </a:fld>
             <a:endParaRPr lang="LID4096"/>
           </a:p>
@@ -2096,7 +2096,7 @@
           <a:p>
             <a:fld id="{91AE326B-1E28-4C22-A3D1-EDFB78E65B5C}" type="datetimeFigureOut">
               <a:rPr lang="LID4096" smtClean="0"/>
-              <a:t>03/03/2024</a:t>
+              <a:t>03/04/2024</a:t>
             </a:fld>
             <a:endParaRPr lang="LID4096"/>
           </a:p>
@@ -2353,7 +2353,7 @@
           <a:p>
             <a:fld id="{91AE326B-1E28-4C22-A3D1-EDFB78E65B5C}" type="datetimeFigureOut">
               <a:rPr lang="LID4096" smtClean="0"/>
-              <a:t>03/03/2024</a:t>
+              <a:t>03/04/2024</a:t>
             </a:fld>
             <a:endParaRPr lang="LID4096"/>
           </a:p>
@@ -2566,7 +2566,7 @@
           <a:p>
             <a:fld id="{91AE326B-1E28-4C22-A3D1-EDFB78E65B5C}" type="datetimeFigureOut">
               <a:rPr lang="LID4096" smtClean="0"/>
-              <a:t>03/03/2024</a:t>
+              <a:t>03/04/2024</a:t>
             </a:fld>
             <a:endParaRPr lang="LID4096"/>
           </a:p>
@@ -3370,8 +3370,8 @@
         </p:nvSpPr>
         <p:spPr>
           <a:xfrm>
-            <a:off x="879232" y="9089841"/>
-            <a:ext cx="29429612" cy="3174373"/>
+            <a:off x="906670" y="9548907"/>
+            <a:ext cx="29368540" cy="2702659"/>
           </a:xfrm>
           <a:custGeom>
             <a:avLst/>
@@ -3516,6 +3516,132 @@
               <a:gd name="connsiteY2" fmla="*/ 3174373 h 3174373"/>
               <a:gd name="connsiteX3" fmla="*/ 29429612 w 29429612"/>
               <a:gd name="connsiteY3" fmla="*/ 659071 h 3174373"/>
+              <a:gd name="connsiteX0" fmla="*/ 0 w 19148942"/>
+              <a:gd name="connsiteY0" fmla="*/ 1584022 h 3174373"/>
+              <a:gd name="connsiteX1" fmla="*/ 9856529 w 19148942"/>
+              <a:gd name="connsiteY1" fmla="*/ 0 h 3174373"/>
+              <a:gd name="connsiteX2" fmla="*/ 19148942 w 19148942"/>
+              <a:gd name="connsiteY2" fmla="*/ 3174373 h 3174373"/>
+              <a:gd name="connsiteX0" fmla="*/ 0 w 19829429"/>
+              <a:gd name="connsiteY0" fmla="*/ 1584022 h 3401443"/>
+              <a:gd name="connsiteX1" fmla="*/ 9856529 w 19829429"/>
+              <a:gd name="connsiteY1" fmla="*/ 0 h 3401443"/>
+              <a:gd name="connsiteX2" fmla="*/ 19148942 w 19829429"/>
+              <a:gd name="connsiteY2" fmla="*/ 3174373 h 3401443"/>
+              <a:gd name="connsiteX3" fmla="*/ 19121454 w 19829429"/>
+              <a:gd name="connsiteY3" fmla="*/ 3145702 h 3401443"/>
+              <a:gd name="connsiteX0" fmla="*/ 0 w 29368542"/>
+              <a:gd name="connsiteY0" fmla="*/ 1584022 h 3250945"/>
+              <a:gd name="connsiteX1" fmla="*/ 9856529 w 29368542"/>
+              <a:gd name="connsiteY1" fmla="*/ 0 h 3250945"/>
+              <a:gd name="connsiteX2" fmla="*/ 19148942 w 29368542"/>
+              <a:gd name="connsiteY2" fmla="*/ 3174373 h 3250945"/>
+              <a:gd name="connsiteX3" fmla="*/ 29368540 w 29368542"/>
+              <a:gd name="connsiteY3" fmla="*/ 1353187 h 3250945"/>
+              <a:gd name="connsiteX0" fmla="*/ 0 w 29368542"/>
+              <a:gd name="connsiteY0" fmla="*/ 1584022 h 3250945"/>
+              <a:gd name="connsiteX1" fmla="*/ 9856529 w 29368542"/>
+              <a:gd name="connsiteY1" fmla="*/ 0 h 3250945"/>
+              <a:gd name="connsiteX2" fmla="*/ 19148942 w 29368542"/>
+              <a:gd name="connsiteY2" fmla="*/ 3174373 h 3250945"/>
+              <a:gd name="connsiteX3" fmla="*/ 29368540 w 29368542"/>
+              <a:gd name="connsiteY3" fmla="*/ 1353187 h 3250945"/>
+              <a:gd name="connsiteX0" fmla="*/ 0 w 29368543"/>
+              <a:gd name="connsiteY0" fmla="*/ 1584022 h 3191777"/>
+              <a:gd name="connsiteX1" fmla="*/ 9856529 w 29368543"/>
+              <a:gd name="connsiteY1" fmla="*/ 0 h 3191777"/>
+              <a:gd name="connsiteX2" fmla="*/ 19148942 w 29368543"/>
+              <a:gd name="connsiteY2" fmla="*/ 3174373 h 3191777"/>
+              <a:gd name="connsiteX3" fmla="*/ 29368540 w 29368543"/>
+              <a:gd name="connsiteY3" fmla="*/ 1353187 h 3191777"/>
+              <a:gd name="connsiteX0" fmla="*/ 0 w 29368543"/>
+              <a:gd name="connsiteY0" fmla="*/ 1584022 h 3191777"/>
+              <a:gd name="connsiteX1" fmla="*/ 9856529 w 29368543"/>
+              <a:gd name="connsiteY1" fmla="*/ 0 h 3191777"/>
+              <a:gd name="connsiteX2" fmla="*/ 19148942 w 29368543"/>
+              <a:gd name="connsiteY2" fmla="*/ 3174373 h 3191777"/>
+              <a:gd name="connsiteX3" fmla="*/ 29368540 w 29368543"/>
+              <a:gd name="connsiteY3" fmla="*/ 1353187 h 3191777"/>
+              <a:gd name="connsiteX0" fmla="*/ 0 w 29368543"/>
+              <a:gd name="connsiteY0" fmla="*/ 1584022 h 3191777"/>
+              <a:gd name="connsiteX1" fmla="*/ 9856529 w 29368543"/>
+              <a:gd name="connsiteY1" fmla="*/ 0 h 3191777"/>
+              <a:gd name="connsiteX2" fmla="*/ 19148942 w 29368543"/>
+              <a:gd name="connsiteY2" fmla="*/ 3174373 h 3191777"/>
+              <a:gd name="connsiteX3" fmla="*/ 29368540 w 29368543"/>
+              <a:gd name="connsiteY3" fmla="*/ 1353187 h 3191777"/>
+              <a:gd name="connsiteX0" fmla="*/ 0 w 29368543"/>
+              <a:gd name="connsiteY0" fmla="*/ 1584022 h 3191777"/>
+              <a:gd name="connsiteX1" fmla="*/ 9856529 w 29368543"/>
+              <a:gd name="connsiteY1" fmla="*/ 0 h 3191777"/>
+              <a:gd name="connsiteX2" fmla="*/ 19148942 w 29368543"/>
+              <a:gd name="connsiteY2" fmla="*/ 3174373 h 3191777"/>
+              <a:gd name="connsiteX3" fmla="*/ 29368540 w 29368543"/>
+              <a:gd name="connsiteY3" fmla="*/ 1353187 h 3191777"/>
+              <a:gd name="connsiteX0" fmla="*/ 0 w 29368543"/>
+              <a:gd name="connsiteY0" fmla="*/ 1584022 h 3191777"/>
+              <a:gd name="connsiteX1" fmla="*/ 9856529 w 29368543"/>
+              <a:gd name="connsiteY1" fmla="*/ 0 h 3191777"/>
+              <a:gd name="connsiteX2" fmla="*/ 19148942 w 29368543"/>
+              <a:gd name="connsiteY2" fmla="*/ 3174373 h 3191777"/>
+              <a:gd name="connsiteX3" fmla="*/ 29368540 w 29368543"/>
+              <a:gd name="connsiteY3" fmla="*/ 1353187 h 3191777"/>
+              <a:gd name="connsiteX0" fmla="*/ 0 w 29368540"/>
+              <a:gd name="connsiteY0" fmla="*/ 1584022 h 3174373"/>
+              <a:gd name="connsiteX1" fmla="*/ 9856529 w 29368540"/>
+              <a:gd name="connsiteY1" fmla="*/ 0 h 3174373"/>
+              <a:gd name="connsiteX2" fmla="*/ 19148942 w 29368540"/>
+              <a:gd name="connsiteY2" fmla="*/ 3174373 h 3174373"/>
+              <a:gd name="connsiteX3" fmla="*/ 29368540 w 29368540"/>
+              <a:gd name="connsiteY3" fmla="*/ 1353187 h 3174373"/>
+              <a:gd name="connsiteX0" fmla="*/ 0 w 29368540"/>
+              <a:gd name="connsiteY0" fmla="*/ 1584022 h 3174373"/>
+              <a:gd name="connsiteX1" fmla="*/ 9856529 w 29368540"/>
+              <a:gd name="connsiteY1" fmla="*/ 0 h 3174373"/>
+              <a:gd name="connsiteX2" fmla="*/ 19148942 w 29368540"/>
+              <a:gd name="connsiteY2" fmla="*/ 3174373 h 3174373"/>
+              <a:gd name="connsiteX3" fmla="*/ 29368540 w 29368540"/>
+              <a:gd name="connsiteY3" fmla="*/ 1353187 h 3174373"/>
+              <a:gd name="connsiteX0" fmla="*/ 0 w 29368540"/>
+              <a:gd name="connsiteY0" fmla="*/ 1264708 h 2855059"/>
+              <a:gd name="connsiteX1" fmla="*/ 9798472 w 29368540"/>
+              <a:gd name="connsiteY1" fmla="*/ 0 h 2855059"/>
+              <a:gd name="connsiteX2" fmla="*/ 19148942 w 29368540"/>
+              <a:gd name="connsiteY2" fmla="*/ 2855059 h 2855059"/>
+              <a:gd name="connsiteX3" fmla="*/ 29368540 w 29368540"/>
+              <a:gd name="connsiteY3" fmla="*/ 1033873 h 2855059"/>
+              <a:gd name="connsiteX0" fmla="*/ 0 w 29368540"/>
+              <a:gd name="connsiteY0" fmla="*/ 1112308 h 2702659"/>
+              <a:gd name="connsiteX1" fmla="*/ 9820243 w 29368540"/>
+              <a:gd name="connsiteY1" fmla="*/ 0 h 2702659"/>
+              <a:gd name="connsiteX2" fmla="*/ 19148942 w 29368540"/>
+              <a:gd name="connsiteY2" fmla="*/ 2702659 h 2702659"/>
+              <a:gd name="connsiteX3" fmla="*/ 29368540 w 29368540"/>
+              <a:gd name="connsiteY3" fmla="*/ 881473 h 2702659"/>
+              <a:gd name="connsiteX0" fmla="*/ 0 w 29368540"/>
+              <a:gd name="connsiteY0" fmla="*/ 1156204 h 2746555"/>
+              <a:gd name="connsiteX1" fmla="*/ 9820243 w 29368540"/>
+              <a:gd name="connsiteY1" fmla="*/ 43896 h 2746555"/>
+              <a:gd name="connsiteX2" fmla="*/ 19148942 w 29368540"/>
+              <a:gd name="connsiteY2" fmla="*/ 2746555 h 2746555"/>
+              <a:gd name="connsiteX3" fmla="*/ 29368540 w 29368540"/>
+              <a:gd name="connsiteY3" fmla="*/ 925369 h 2746555"/>
+              <a:gd name="connsiteX0" fmla="*/ 0 w 29368540"/>
+              <a:gd name="connsiteY0" fmla="*/ 1112308 h 2702659"/>
+              <a:gd name="connsiteX1" fmla="*/ 9820243 w 29368540"/>
+              <a:gd name="connsiteY1" fmla="*/ 0 h 2702659"/>
+              <a:gd name="connsiteX2" fmla="*/ 19148942 w 29368540"/>
+              <a:gd name="connsiteY2" fmla="*/ 2702659 h 2702659"/>
+              <a:gd name="connsiteX3" fmla="*/ 29368540 w 29368540"/>
+              <a:gd name="connsiteY3" fmla="*/ 881473 h 2702659"/>
+              <a:gd name="connsiteX0" fmla="*/ 0 w 29368540"/>
+              <a:gd name="connsiteY0" fmla="*/ 1112308 h 2702659"/>
+              <a:gd name="connsiteX1" fmla="*/ 9820243 w 29368540"/>
+              <a:gd name="connsiteY1" fmla="*/ 0 h 2702659"/>
+              <a:gd name="connsiteX2" fmla="*/ 19148942 w 29368540"/>
+              <a:gd name="connsiteY2" fmla="*/ 2702659 h 2702659"/>
+              <a:gd name="connsiteX3" fmla="*/ 29368540 w 29368540"/>
+              <a:gd name="connsiteY3" fmla="*/ 881473 h 2702659"/>
             </a:gdLst>
             <a:ahLst/>
             <a:cxnLst>
@@ -3534,18 +3660,18 @@
             </a:cxnLst>
             <a:rect l="l" t="t" r="r" b="b"/>
             <a:pathLst>
-              <a:path w="29429612" h="3174373">
+              <a:path w="29368540" h="2702659">
                 <a:moveTo>
-                  <a:pt x="0" y="1584022"/>
+                  <a:pt x="0" y="1112308"/>
                 </a:moveTo>
                 <a:lnTo>
-                  <a:pt x="9856529" y="0"/>
+                  <a:pt x="9820243" y="0"/>
                 </a:lnTo>
                 <a:lnTo>
-                  <a:pt x="19148942" y="3174373"/>
+                  <a:pt x="19148942" y="2702659"/>
                 </a:lnTo>
                 <a:lnTo>
-                  <a:pt x="29429612" y="659071"/>
+                  <a:pt x="29368540" y="881473"/>
                 </a:lnTo>
               </a:path>
             </a:pathLst>
@@ -3650,7 +3776,7 @@
         </p:nvSpPr>
         <p:spPr>
           <a:xfrm>
-            <a:off x="29641829" y="9497818"/>
+            <a:off x="29512393" y="10158722"/>
             <a:ext cx="682560" cy="682560"/>
           </a:xfrm>
           <a:prstGeom prst="ellipse">
@@ -3707,7 +3833,7 @@
         </p:nvSpPr>
         <p:spPr>
           <a:xfrm>
-            <a:off x="10383261" y="8820048"/>
+            <a:off x="10376280" y="9208034"/>
             <a:ext cx="682560" cy="682560"/>
           </a:xfrm>
           <a:prstGeom prst="ellipse">
@@ -3802,7 +3928,7 @@
         </p:nvSpPr>
         <p:spPr>
           <a:xfrm>
-            <a:off x="1136991" y="2736366"/>
+            <a:off x="1135321" y="2649376"/>
             <a:ext cx="9267407" cy="2400657"/>
           </a:xfrm>
           <a:prstGeom prst="rect">
@@ -3856,7 +3982,19 @@
               <a:rPr lang="en-US" dirty="0" err="1">
                 <a:latin typeface="Georgia" panose="02040502050405020303" pitchFamily="18" charset="0"/>
               </a:rPr>
-              <a:t>lichaamsgewichtoefeningen</a:t>
+              <a:t>fysieke</a:t>
+            </a:r>
+            <a:r>
+              <a:rPr lang="en-US" dirty="0">
+                <a:latin typeface="Georgia" panose="02040502050405020303" pitchFamily="18" charset="0"/>
+              </a:rPr>
+              <a:t> </a:t>
+            </a:r>
+            <a:r>
+              <a:rPr lang="en-US" dirty="0" err="1">
+                <a:latin typeface="Georgia" panose="02040502050405020303" pitchFamily="18" charset="0"/>
+              </a:rPr>
+              <a:t>oefeningen</a:t>
             </a:r>
             <a:r>
               <a:rPr lang="en-US" dirty="0">
@@ -3916,19 +4054,85 @@
               <a:rPr lang="en-US" dirty="0">
                 <a:latin typeface="Georgia" panose="02040502050405020303" pitchFamily="18" charset="0"/>
               </a:rPr>
-              <a:t> </a:t>
+              <a:t> op hand, </a:t>
             </a:r>
             <a:r>
               <a:rPr lang="en-US" dirty="0" err="1">
                 <a:latin typeface="Georgia" panose="02040502050405020303" pitchFamily="18" charset="0"/>
               </a:rPr>
-              <a:t>voor</a:t>
-            </a:r>
-            <a:r>
-              <a:rPr lang="en-US" dirty="0">
-                <a:latin typeface="Georgia" panose="02040502050405020303" pitchFamily="18" charset="0"/>
-              </a:rPr>
-              <a:t> X-as, Y-as </a:t>
+              <a:t>knie</a:t>
+            </a:r>
+            <a:r>
+              <a:rPr lang="en-US" dirty="0">
+                <a:latin typeface="Georgia" panose="02040502050405020303" pitchFamily="18" charset="0"/>
+              </a:rPr>
+              <a:t>, </a:t>
+            </a:r>
+            <a:r>
+              <a:rPr lang="en-US" dirty="0" err="1">
+                <a:latin typeface="Georgia" panose="02040502050405020303" pitchFamily="18" charset="0"/>
+              </a:rPr>
+              <a:t>voet</a:t>
+            </a:r>
+            <a:r>
+              <a:rPr lang="en-US" dirty="0">
+                <a:latin typeface="Georgia" panose="02040502050405020303" pitchFamily="18" charset="0"/>
+              </a:rPr>
+              <a:t>, </a:t>
+            </a:r>
+            <a:r>
+              <a:rPr lang="en-US" dirty="0" err="1">
+                <a:latin typeface="Georgia" panose="02040502050405020303" pitchFamily="18" charset="0"/>
+              </a:rPr>
+              <a:t>etc</a:t>
+            </a:r>
+            <a:endParaRPr lang="en-US" dirty="0">
+              <a:latin typeface="Georgia" panose="02040502050405020303" pitchFamily="18" charset="0"/>
+            </a:endParaRPr>
+          </a:p>
+          <a:p>
+            <a:pPr lvl="1"/>
+            <a:r>
+              <a:rPr lang="en-US" dirty="0">
+                <a:latin typeface="Georgia" panose="02040502050405020303" pitchFamily="18" charset="0"/>
+              </a:rPr>
+              <a:t>	 → </a:t>
+            </a:r>
+            <a:r>
+              <a:rPr lang="en-US" dirty="0" err="1">
+                <a:latin typeface="Georgia" panose="02040502050405020303" pitchFamily="18" charset="0"/>
+              </a:rPr>
+              <a:t>Positie</a:t>
+            </a:r>
+            <a:r>
+              <a:rPr lang="en-US" dirty="0">
+                <a:latin typeface="Georgia" panose="02040502050405020303" pitchFamily="18" charset="0"/>
+              </a:rPr>
+              <a:t> van </a:t>
+            </a:r>
+            <a:r>
+              <a:rPr lang="en-US" dirty="0" err="1">
+                <a:latin typeface="Georgia" panose="02040502050405020303" pitchFamily="18" charset="0"/>
+              </a:rPr>
+              <a:t>sensoren</a:t>
+            </a:r>
+            <a:r>
+              <a:rPr lang="en-US" dirty="0">
+                <a:latin typeface="Georgia" panose="02040502050405020303" pitchFamily="18" charset="0"/>
+              </a:rPr>
+              <a:t> </a:t>
+            </a:r>
+            <a:r>
+              <a:rPr lang="en-US" dirty="0" err="1">
+                <a:latin typeface="Georgia" panose="02040502050405020303" pitchFamily="18" charset="0"/>
+              </a:rPr>
+              <a:t>opdelen</a:t>
+            </a:r>
+            <a:r>
+              <a:rPr lang="en-US" dirty="0">
+                <a:latin typeface="Georgia" panose="02040502050405020303" pitchFamily="18" charset="0"/>
+              </a:rPr>
+              <a:t> in X-, Y- </a:t>
             </a:r>
             <a:r>
               <a:rPr lang="en-US" dirty="0" err="1">
@@ -3948,44 +4152,11 @@
               <a:buFont typeface="Arial" panose="020B0604020202020204" pitchFamily="34" charset="0"/>
               <a:buChar char="•"/>
             </a:pPr>
-            <a:endParaRPr lang="en-US" dirty="0">
-              <a:latin typeface="Georgia" panose="02040502050405020303" pitchFamily="18" charset="0"/>
-            </a:endParaRPr>
-          </a:p>
-          <a:p>
-            <a:pPr marL="742950" lvl="1" indent="-285750">
-              <a:buFont typeface="Arial" panose="020B0604020202020204" pitchFamily="34" charset="0"/>
-              <a:buChar char="•"/>
-            </a:pPr>
             <a:r>
               <a:rPr lang="en-US" b="1" dirty="0" err="1">
                 <a:latin typeface="Georgia" panose="02040502050405020303" pitchFamily="18" charset="0"/>
               </a:rPr>
               <a:t>Tijdsreeksen</a:t>
-            </a:r>
-            <a:r>
-              <a:rPr lang="en-US" dirty="0">
-                <a:latin typeface="Georgia" panose="02040502050405020303" pitchFamily="18" charset="0"/>
-              </a:rPr>
-              <a:t> </a:t>
-            </a:r>
-            <a:r>
-              <a:rPr lang="en-US" dirty="0" err="1">
-                <a:latin typeface="Georgia" panose="02040502050405020303" pitchFamily="18" charset="0"/>
-              </a:rPr>
-              <a:t>als</a:t>
-            </a:r>
-            <a:r>
-              <a:rPr lang="en-US" dirty="0">
-                <a:latin typeface="Georgia" panose="02040502050405020303" pitchFamily="18" charset="0"/>
-              </a:rPr>
-              <a:t> </a:t>
-            </a:r>
-            <a:r>
-              <a:rPr lang="en-US" dirty="0" err="1">
-                <a:latin typeface="Georgia" panose="02040502050405020303" pitchFamily="18" charset="0"/>
-              </a:rPr>
-              <a:t>datapunten</a:t>
             </a:r>
             <a:r>
               <a:rPr lang="en-US" dirty="0">
@@ -4135,8 +4306,8 @@
         </p:nvSpPr>
         <p:spPr>
           <a:xfrm>
-            <a:off x="1121103" y="7380731"/>
-            <a:ext cx="9267409" cy="2400657"/>
+            <a:off x="1119433" y="7293741"/>
+            <a:ext cx="9267409" cy="2677656"/>
           </a:xfrm>
           <a:prstGeom prst="rect">
             <a:avLst/>
@@ -4151,7 +4322,7 @@
           <a:p>
             <a:r>
               <a:rPr lang="en-US" sz="2400" b="1" dirty="0" err="1"/>
-              <a:t>Datapunten</a:t>
+              <a:t>Tijdsreeksen</a:t>
             </a:r>
             <a:r>
               <a:rPr lang="en-US" sz="2400" b="1" dirty="0"/>
@@ -4252,6 +4423,44 @@
             </a:pPr>
             <a:r>
               <a:rPr lang="en-US" dirty="0"/>
+              <a:t>Kan </a:t>
+            </a:r>
+            <a:r>
+              <a:rPr lang="en-US" dirty="0" err="1"/>
+              <a:t>niet-gesynchroniseerde</a:t>
+            </a:r>
+            <a:r>
+              <a:rPr lang="en-US" dirty="0"/>
+              <a:t> </a:t>
+            </a:r>
+            <a:r>
+              <a:rPr lang="en-US" dirty="0" err="1"/>
+              <a:t>tijdsreeksen</a:t>
+            </a:r>
+            <a:r>
+              <a:rPr lang="en-US" dirty="0"/>
+              <a:t> </a:t>
+            </a:r>
+            <a:r>
+              <a:rPr lang="en-US" dirty="0" err="1"/>
+              <a:t>vergelijken</a:t>
+            </a:r>
+            <a:endParaRPr lang="en-US" dirty="0"/>
+          </a:p>
+          <a:p>
+            <a:pPr lvl="2"/>
+            <a:r>
+              <a:rPr lang="en-US" dirty="0"/>
+              <a:t>	</a:t>
+            </a:r>
+            <a:r>
+              <a:rPr lang="en-US" dirty="0">
+                <a:latin typeface="Georgia" panose="02040502050405020303" pitchFamily="18" charset="0"/>
+              </a:rPr>
+              <a:t> → </a:t>
+            </a:r>
+            <a:r>
+              <a:rPr lang="en-US" dirty="0"/>
               <a:t>O(n</a:t>
             </a:r>
             <a:r>
@@ -4329,11 +4538,11 @@
             </a:r>
             <a:r>
               <a:rPr lang="en-US" dirty="0"/>
-              <a:t> </a:t>
+              <a:t> Alle </a:t>
             </a:r>
             <a:r>
               <a:rPr lang="en-US" dirty="0" err="1"/>
-              <a:t>Elementen</a:t>
+              <a:t>elementen</a:t>
             </a:r>
             <a:r>
               <a:rPr lang="en-US" dirty="0"/>
@@ -4379,8 +4588,8 @@
         </p:nvSpPr>
         <p:spPr>
           <a:xfrm>
-            <a:off x="11044671" y="2750657"/>
-            <a:ext cx="8647173" cy="5693866"/>
+            <a:off x="11034092" y="2661668"/>
+            <a:ext cx="8647173" cy="5970865"/>
           </a:xfrm>
           <a:prstGeom prst="rect">
             <a:avLst/>
@@ -4786,14 +4995,11 @@
               <a:buChar char="•"/>
             </a:pPr>
             <a:r>
-              <a:rPr lang="en-US" dirty="0" err="1">
-                <a:latin typeface="Georgia" panose="02040502050405020303" pitchFamily="18" charset="0"/>
-              </a:rPr>
-              <a:t>Kostelijker</a:t>
-            </a:r>
-            <a:endParaRPr lang="en-US" dirty="0">
-              <a:latin typeface="Georgia" panose="02040502050405020303" pitchFamily="18" charset="0"/>
-            </a:endParaRPr>
+              <a:rPr lang="en-US" dirty="0">
+                <a:latin typeface="Georgia" panose="02040502050405020303" pitchFamily="18" charset="0"/>
+              </a:rPr>
+              <a:t>Dure termen</a:t>
+            </a:r>
           </a:p>
           <a:p>
             <a:endParaRPr lang="en-US" dirty="0">
@@ -4850,6 +5056,27 @@
               <a:rPr lang="en-US" dirty="0" err="1">
                 <a:latin typeface="Georgia" panose="02040502050405020303" pitchFamily="18" charset="0"/>
               </a:rPr>
+              <a:t>Goedkope</a:t>
+            </a:r>
+            <a:r>
+              <a:rPr lang="en-US" dirty="0">
+                <a:latin typeface="Georgia" panose="02040502050405020303" pitchFamily="18" charset="0"/>
+              </a:rPr>
+              <a:t> termen </a:t>
+            </a:r>
+          </a:p>
+          <a:p>
+            <a:pPr lvl="1"/>
+            <a:r>
+              <a:rPr lang="en-US" dirty="0">
+                <a:latin typeface="Georgia" panose="02040502050405020303" pitchFamily="18" charset="0"/>
+              </a:rPr>
+              <a:t>	-&gt; </a:t>
+            </a:r>
+            <a:r>
+              <a:rPr lang="en-US" dirty="0" err="1">
+                <a:latin typeface="Georgia" panose="02040502050405020303" pitchFamily="18" charset="0"/>
+              </a:rPr>
               <a:t>Hogere</a:t>
             </a:r>
             <a:r>
@@ -4876,9 +5103,48 @@
               </a:rPr>
               <a:t>fout</a:t>
             </a:r>
-            <a:endParaRPr lang="en-US" dirty="0">
-              <a:latin typeface="Georgia" panose="02040502050405020303" pitchFamily="18" charset="0"/>
-            </a:endParaRPr>
+            <a:r>
+              <a:rPr lang="en-US" dirty="0">
+                <a:latin typeface="Georgia" panose="02040502050405020303" pitchFamily="18" charset="0"/>
+              </a:rPr>
+              <a:t> dan Matrix </a:t>
+            </a:r>
+            <a:r>
+              <a:rPr lang="en-US" dirty="0" err="1">
+                <a:latin typeface="Georgia" panose="02040502050405020303" pitchFamily="18" charset="0"/>
+              </a:rPr>
+              <a:t>Methode</a:t>
+            </a:r>
+            <a:r>
+              <a:rPr lang="en-US" dirty="0">
+                <a:latin typeface="Georgia" panose="02040502050405020303" pitchFamily="18" charset="0"/>
+              </a:rPr>
+              <a:t> </a:t>
+            </a:r>
+            <a:r>
+              <a:rPr lang="en-US" dirty="0" err="1">
+                <a:latin typeface="Georgia" panose="02040502050405020303" pitchFamily="18" charset="0"/>
+              </a:rPr>
+              <a:t>bij</a:t>
+            </a:r>
+            <a:r>
+              <a:rPr lang="en-US" dirty="0">
+                <a:latin typeface="Georgia" panose="02040502050405020303" pitchFamily="18" charset="0"/>
+              </a:rPr>
+              <a:t> </a:t>
+            </a:r>
+            <a:r>
+              <a:rPr lang="en-US" dirty="0" err="1">
+                <a:latin typeface="Georgia" panose="02040502050405020303" pitchFamily="18" charset="0"/>
+              </a:rPr>
+              <a:t>gelijke</a:t>
+            </a:r>
+            <a:r>
+              <a:rPr lang="en-US" dirty="0">
+                <a:latin typeface="Georgia" panose="02040502050405020303" pitchFamily="18" charset="0"/>
+              </a:rPr>
+              <a:t> rang</a:t>
+            </a:r>
           </a:p>
         </p:txBody>
       </p:sp>
@@ -4913,7 +5179,7 @@
         </p:blipFill>
         <p:spPr>
           <a:xfrm>
-            <a:off x="13006245" y="8343634"/>
+            <a:off x="13140478" y="8539320"/>
             <a:ext cx="6737272" cy="1243187"/>
           </a:xfrm>
           <a:prstGeom prst="rect">
@@ -4952,7 +5218,7 @@
         </p:blipFill>
         <p:spPr>
           <a:xfrm>
-            <a:off x="13006245" y="6365849"/>
+            <a:off x="13140478" y="6340070"/>
             <a:ext cx="6737272" cy="1273509"/>
           </a:xfrm>
           <a:prstGeom prst="rect">
@@ -5321,7 +5587,7 @@
               <a:rPr lang="en-US" i="1" dirty="0" err="1">
                 <a:latin typeface="Georgia" panose="02040502050405020303" pitchFamily="18" charset="0"/>
               </a:rPr>
-              <a:t>bepaald</a:t>
+              <a:t>bepaalt</a:t>
             </a:r>
             <a:r>
               <a:rPr lang="en-US" i="1" dirty="0">
@@ -5614,7 +5880,7 @@
                 </a:solidFill>
                 <a:latin typeface="Georgia" panose="02040502050405020303" pitchFamily="18" charset="0"/>
               </a:rPr>
-              <a:t>benadering</a:t>
+              <a:t>Benadering</a:t>
             </a:r>
             <a:endParaRPr kumimoji="0" lang="en-US" sz="4000" b="1" i="0" u="none" strike="noStrike" kern="1200" cap="none" spc="0" normalizeH="0" baseline="0" noProof="0" dirty="0">
               <a:ln>
@@ -5771,17 +6037,19 @@
           <a:noFill/>
           <a:ln>
             <a:noFill/>
+            <a:headEnd type="none" w="med" len="med"/>
+            <a:tailEnd type="none" w="med" len="med"/>
           </a:ln>
         </p:spPr>
         <p:style>
-          <a:lnRef idx="0">
-            <a:scrgbClr r="0" g="0" b="0"/>
+          <a:lnRef idx="1">
+            <a:schemeClr val="accent5"/>
           </a:lnRef>
-          <a:fillRef idx="0">
-            <a:scrgbClr r="0" g="0" b="0"/>
+          <a:fillRef idx="2">
+            <a:schemeClr val="accent5"/>
           </a:fillRef>
-          <a:effectRef idx="0">
-            <a:scrgbClr r="0" g="0" b="0"/>
+          <a:effectRef idx="1">
+            <a:schemeClr val="accent5"/>
           </a:effectRef>
           <a:fontRef idx="minor">
             <a:schemeClr val="dk1"/>
@@ -6053,10 +6321,16 @@
               <a:buChar char="•"/>
             </a:pPr>
             <a:r>
+              <a:rPr lang="en-US" dirty="0">
+                <a:latin typeface="Georgia" panose="02040502050405020303" pitchFamily="18" charset="0"/>
+              </a:rPr>
+              <a:t>Matrix </a:t>
+            </a:r>
+            <a:r>
               <a:rPr lang="en-US" dirty="0" err="1">
                 <a:latin typeface="Georgia" panose="02040502050405020303" pitchFamily="18" charset="0"/>
               </a:rPr>
-              <a:t>Starten</a:t>
+              <a:t>methode</a:t>
             </a:r>
             <a:r>
               <a:rPr lang="en-US" dirty="0">
@@ -6068,19 +6342,67 @@
               <a:rPr lang="en-US" dirty="0" err="1">
                 <a:latin typeface="Georgia" panose="02040502050405020303" pitchFamily="18" charset="0"/>
               </a:rPr>
-              <a:t>vanuit</a:t>
-            </a:r>
-            <a:r>
-              <a:rPr lang="en-US" dirty="0">
-                <a:latin typeface="Georgia" panose="02040502050405020303" pitchFamily="18" charset="0"/>
-              </a:rPr>
-              <a:t> de matrix </a:t>
+              <a:t>zonder</a:t>
+            </a:r>
+            <a:r>
+              <a:rPr lang="en-US" dirty="0">
+                <a:latin typeface="Georgia" panose="02040502050405020303" pitchFamily="18" charset="0"/>
+              </a:rPr>
+              <a:t> </a:t>
             </a:r>
             <a:r>
               <a:rPr lang="en-US" dirty="0" err="1">
                 <a:latin typeface="Georgia" panose="02040502050405020303" pitchFamily="18" charset="0"/>
               </a:rPr>
-              <a:t>methode</a:t>
+              <a:t>elke</a:t>
+            </a:r>
+            <a:r>
+              <a:rPr lang="en-US" dirty="0">
+                <a:latin typeface="Georgia" panose="02040502050405020303" pitchFamily="18" charset="0"/>
+              </a:rPr>
+              <a:t> matrix </a:t>
+            </a:r>
+            <a:r>
+              <a:rPr lang="en-US" dirty="0" err="1">
+                <a:latin typeface="Georgia" panose="02040502050405020303" pitchFamily="18" charset="0"/>
+              </a:rPr>
+              <a:t>volledig</a:t>
+            </a:r>
+            <a:r>
+              <a:rPr lang="en-US" dirty="0">
+                <a:latin typeface="Georgia" panose="02040502050405020303" pitchFamily="18" charset="0"/>
+              </a:rPr>
+              <a:t> </a:t>
+            </a:r>
+            <a:r>
+              <a:rPr lang="en-US" dirty="0" err="1">
+                <a:latin typeface="Georgia" panose="02040502050405020303" pitchFamily="18" charset="0"/>
+              </a:rPr>
+              <a:t>te</a:t>
+            </a:r>
+            <a:r>
+              <a:rPr lang="en-US" dirty="0">
+                <a:latin typeface="Georgia" panose="02040502050405020303" pitchFamily="18" charset="0"/>
+              </a:rPr>
+              <a:t> </a:t>
+            </a:r>
+            <a:r>
+              <a:rPr lang="en-US" dirty="0" err="1">
+                <a:latin typeface="Georgia" panose="02040502050405020303" pitchFamily="18" charset="0"/>
+              </a:rPr>
+              <a:t>bepalen</a:t>
+            </a:r>
+            <a:r>
+              <a:rPr lang="en-US" dirty="0">
+                <a:latin typeface="Georgia" panose="02040502050405020303" pitchFamily="18" charset="0"/>
+              </a:rPr>
+              <a:t> → </a:t>
+            </a:r>
+            <a:r>
+              <a:rPr lang="en-US" dirty="0" err="1">
+                <a:latin typeface="Georgia" panose="02040502050405020303" pitchFamily="18" charset="0"/>
+              </a:rPr>
+              <a:t>goedkoper</a:t>
             </a:r>
             <a:endParaRPr lang="en-US" dirty="0">
               <a:latin typeface="Georgia" panose="02040502050405020303" pitchFamily="18" charset="0"/>
@@ -6108,18 +6430,6 @@
                 <a:latin typeface="Georgia" panose="02040502050405020303" pitchFamily="18" charset="0"/>
               </a:rPr>
               <a:t> term </a:t>
-            </a:r>
-            <a:r>
-              <a:rPr lang="en-US" dirty="0" err="1">
-                <a:latin typeface="Georgia" panose="02040502050405020303" pitchFamily="18" charset="0"/>
-              </a:rPr>
-              <a:t>opnieuw</a:t>
-            </a:r>
-            <a:r>
-              <a:rPr lang="en-US" dirty="0">
-                <a:latin typeface="Georgia" panose="02040502050405020303" pitchFamily="18" charset="0"/>
-              </a:rPr>
-              <a:t> </a:t>
             </a:r>
             <a:r>
               <a:rPr lang="en-US" dirty="0" err="1">
@@ -8418,7 +8728,7 @@
         <p:spPr>
           <a:xfrm>
             <a:off x="26338624" y="7009790"/>
-            <a:ext cx="3733800" cy="2677656"/>
+            <a:ext cx="3733800" cy="2893100"/>
           </a:xfrm>
           <a:prstGeom prst="rect">
             <a:avLst/>
@@ -8799,20 +9109,77 @@
               <a:rPr lang="en-US" sz="1400" dirty="0">
                 <a:latin typeface="Georgia" panose="02040502050405020303" pitchFamily="18" charset="0"/>
               </a:rPr>
-              <a:t> </a:t>
+              <a:t> ideal: </a:t>
             </a:r>
             <a:r>
               <a:rPr lang="en-US" sz="1400" dirty="0" err="1">
                 <a:latin typeface="Georgia" panose="02040502050405020303" pitchFamily="18" charset="0"/>
               </a:rPr>
-              <a:t>ideaal</a:t>
+              <a:t>goede</a:t>
             </a:r>
             <a:r>
               <a:rPr lang="en-US" sz="1400" dirty="0">
                 <a:latin typeface="Georgia" panose="02040502050405020303" pitchFamily="18" charset="0"/>
               </a:rPr>
-              <a:t>.</a:t>
-            </a:r>
+              <a:t> </a:t>
+            </a:r>
+            <a:r>
+              <a:rPr lang="en-US" sz="1400" dirty="0" err="1">
+                <a:latin typeface="Georgia" panose="02040502050405020303" pitchFamily="18" charset="0"/>
+              </a:rPr>
+              <a:t>balans</a:t>
+            </a:r>
+            <a:r>
+              <a:rPr lang="en-US" sz="1400" dirty="0">
+                <a:latin typeface="Georgia" panose="02040502050405020303" pitchFamily="18" charset="0"/>
+              </a:rPr>
+              <a:t> </a:t>
+            </a:r>
+            <a:r>
+              <a:rPr lang="en-US" sz="1400" dirty="0" err="1">
+                <a:latin typeface="Georgia" panose="02040502050405020303" pitchFamily="18" charset="0"/>
+              </a:rPr>
+              <a:t>tussen</a:t>
+            </a:r>
+            <a:r>
+              <a:rPr lang="en-US" sz="1400" dirty="0">
+                <a:latin typeface="Georgia" panose="02040502050405020303" pitchFamily="18" charset="0"/>
+              </a:rPr>
+              <a:t> </a:t>
+            </a:r>
+            <a:r>
+              <a:rPr lang="en-US" sz="1400" dirty="0" err="1">
+                <a:latin typeface="Georgia" panose="02040502050405020303" pitchFamily="18" charset="0"/>
+              </a:rPr>
+              <a:t>rekentijd</a:t>
+            </a:r>
+            <a:r>
+              <a:rPr lang="en-US" sz="1400" dirty="0">
+                <a:latin typeface="Georgia" panose="02040502050405020303" pitchFamily="18" charset="0"/>
+              </a:rPr>
+              <a:t> </a:t>
+            </a:r>
+            <a:r>
+              <a:rPr lang="en-US" sz="1400" dirty="0" err="1">
+                <a:latin typeface="Georgia" panose="02040502050405020303" pitchFamily="18" charset="0"/>
+              </a:rPr>
+              <a:t>en</a:t>
+            </a:r>
+            <a:r>
+              <a:rPr lang="en-US" sz="1400" dirty="0">
+                <a:latin typeface="Georgia" panose="02040502050405020303" pitchFamily="18" charset="0"/>
+              </a:rPr>
+              <a:t> </a:t>
+            </a:r>
+            <a:r>
+              <a:rPr lang="en-US" sz="1400" dirty="0" err="1">
+                <a:latin typeface="Georgia" panose="02040502050405020303" pitchFamily="18" charset="0"/>
+              </a:rPr>
+              <a:t>nauwkeurigheid</a:t>
+            </a:r>
+            <a:endParaRPr lang="en-US" sz="1400" dirty="0">
+              <a:latin typeface="Georgia" panose="02040502050405020303" pitchFamily="18" charset="0"/>
+            </a:endParaRPr>
           </a:p>
         </p:txBody>
       </p:sp>
@@ -8833,8 +9200,8 @@
         </p:nvCxnSpPr>
         <p:spPr>
           <a:xfrm flipH="1">
-            <a:off x="7904463" y="6145665"/>
-            <a:ext cx="1038302" cy="144206"/>
+            <a:off x="7904463" y="6061027"/>
+            <a:ext cx="1038302" cy="228844"/>
           </a:xfrm>
           <a:prstGeom prst="straightConnector1">
             <a:avLst/>
@@ -8873,7 +9240,7 @@
         <p:spPr>
           <a:xfrm>
             <a:off x="8942765" y="5845583"/>
-            <a:ext cx="1436717" cy="600164"/>
+            <a:ext cx="1436717" cy="430887"/>
           </a:xfrm>
           <a:prstGeom prst="rect">
             <a:avLst/>
@@ -8891,31 +9258,7 @@
               <a:rPr lang="en-US" sz="1100" dirty="0" err="1">
                 <a:latin typeface="Georgia" panose="02040502050405020303" pitchFamily="18" charset="0"/>
               </a:rPr>
-              <a:t>Puur</a:t>
-            </a:r>
-            <a:r>
-              <a:rPr lang="en-US" sz="1100" dirty="0">
-                <a:latin typeface="Georgia" panose="02040502050405020303" pitchFamily="18" charset="0"/>
-              </a:rPr>
-              <a:t> </a:t>
-            </a:r>
-            <a:r>
-              <a:rPr lang="en-US" sz="1100" dirty="0" err="1">
-                <a:latin typeface="Georgia" panose="02040502050405020303" pitchFamily="18" charset="0"/>
-              </a:rPr>
-              <a:t>illustratief</a:t>
-            </a:r>
-            <a:r>
-              <a:rPr lang="en-US" sz="1100" dirty="0">
-                <a:latin typeface="Georgia" panose="02040502050405020303" pitchFamily="18" charset="0"/>
-              </a:rPr>
-              <a:t> </a:t>
-            </a:r>
-            <a:r>
-              <a:rPr lang="en-US" sz="1100" dirty="0" err="1">
-                <a:latin typeface="Georgia" panose="02040502050405020303" pitchFamily="18" charset="0"/>
-              </a:rPr>
-              <a:t>voorbeeld</a:t>
+              <a:t>Voorbeeld</a:t>
             </a:r>
             <a:r>
               <a:rPr lang="en-US" sz="1100" dirty="0">
@@ -8978,7 +9321,7 @@
         </p:blipFill>
         <p:spPr>
           <a:xfrm>
-            <a:off x="856604" y="5231896"/>
+            <a:off x="854934" y="5144906"/>
             <a:ext cx="7691709" cy="2115951"/>
           </a:xfrm>
           <a:prstGeom prst="rect">
@@ -9213,12 +9556,88 @@
           </a:prstGeom>
         </p:spPr>
       </p:pic>
+      <p:sp>
+        <p:nvSpPr>
+          <p:cNvPr id="5" name="TextBox 4">
+            <a:extLst>
+              <a:ext uri="{FF2B5EF4-FFF2-40B4-BE49-F238E27FC236}">
+                <a16:creationId xmlns:a16="http://schemas.microsoft.com/office/drawing/2014/main" id="{3DA5623C-A419-F993-3791-368D1576DC2F}"/>
+              </a:ext>
+            </a:extLst>
+          </p:cNvPr>
+          <p:cNvSpPr txBox="1"/>
+          <p:nvPr/>
+        </p:nvSpPr>
+        <p:spPr>
+          <a:xfrm>
+            <a:off x="18244457" y="20958629"/>
+            <a:ext cx="10512467" cy="369332"/>
+          </a:xfrm>
+          <a:prstGeom prst="rect">
+            <a:avLst/>
+          </a:prstGeom>
+          <a:noFill/>
+        </p:spPr>
+        <p:txBody>
+          <a:bodyPr wrap="square" rtlCol="0">
+            <a:spAutoFit/>
+          </a:bodyPr>
+          <a:lstStyle/>
+          <a:p>
+            <a:r>
+              <a:rPr lang="en-US" dirty="0" err="1">
+                <a:latin typeface="Georgia" panose="02040502050405020303" pitchFamily="18" charset="0"/>
+              </a:rPr>
+              <a:t>Gebaseerd</a:t>
+            </a:r>
+            <a:r>
+              <a:rPr lang="en-US" dirty="0">
+                <a:latin typeface="Georgia" panose="02040502050405020303" pitchFamily="18" charset="0"/>
+              </a:rPr>
+              <a:t> op: </a:t>
+            </a:r>
+            <a:r>
+              <a:rPr lang="nl-NL" dirty="0">
+                <a:latin typeface="Georgia" panose="02040502050405020303" pitchFamily="18" charset="0"/>
+              </a:rPr>
+              <a:t>T. </a:t>
+            </a:r>
+            <a:r>
+              <a:rPr lang="nl-NL" dirty="0" err="1">
+                <a:latin typeface="Georgia" panose="02040502050405020303" pitchFamily="18" charset="0"/>
+              </a:rPr>
+              <a:t>Vanhoof</a:t>
+            </a:r>
+            <a:r>
+              <a:rPr lang="nl-NL" dirty="0">
+                <a:latin typeface="Georgia" panose="02040502050405020303" pitchFamily="18" charset="0"/>
+              </a:rPr>
+              <a:t>. Adaptieve tensor </a:t>
+            </a:r>
+            <a:r>
+              <a:rPr lang="nl-NL" dirty="0" err="1">
+                <a:latin typeface="Georgia" panose="02040502050405020303" pitchFamily="18" charset="0"/>
+              </a:rPr>
+              <a:t>factorisaties</a:t>
+            </a:r>
+            <a:r>
+              <a:rPr lang="nl-NL" dirty="0">
+                <a:latin typeface="Georgia" panose="02040502050405020303" pitchFamily="18" charset="0"/>
+              </a:rPr>
+              <a:t> om versneld tijdreeksen te clusteren, 2023</a:t>
+            </a:r>
+            <a:endParaRPr lang="LID4096" dirty="0">
+              <a:latin typeface="Georgia" panose="02040502050405020303" pitchFamily="18" charset="0"/>
+            </a:endParaRPr>
+          </a:p>
+        </p:txBody>
+      </p:sp>
       <p:pic>
         <p:nvPicPr>
-          <p:cNvPr id="67" name="Graphic 66">
+          <p:cNvPr id="25" name="Graphic 24">
             <a:extLst>
               <a:ext uri="{FF2B5EF4-FFF2-40B4-BE49-F238E27FC236}">
-                <a16:creationId xmlns:a16="http://schemas.microsoft.com/office/drawing/2014/main" id="{57BDBFE8-DA5A-C56D-2E00-3EF365C354FB}"/>
+                <a16:creationId xmlns:a16="http://schemas.microsoft.com/office/drawing/2014/main" id="{4A4B5D3D-E5A2-FEF8-FBD7-185132A593A6}"/>
               </a:ext>
             </a:extLst>
           </p:cNvPr>

</xml_diff>

<commit_message>
Poster (almost?) final updates
</commit_message>
<xml_diff>
--- a/poster/Poster.pptx
+++ b/poster/Poster.pptx
@@ -3929,7 +3929,7 @@
         <p:spPr>
           <a:xfrm>
             <a:off x="1135321" y="2649376"/>
-            <a:ext cx="9267407" cy="2400657"/>
+            <a:ext cx="9267407" cy="2677656"/>
           </a:xfrm>
           <a:prstGeom prst="rect">
             <a:avLst/>
@@ -4078,73 +4078,7 @@
               <a:rPr lang="en-US" dirty="0">
                 <a:latin typeface="Georgia" panose="02040502050405020303" pitchFamily="18" charset="0"/>
               </a:rPr>
-              <a:t>, </a:t>
-            </a:r>
-            <a:r>
-              <a:rPr lang="en-US" dirty="0" err="1">
-                <a:latin typeface="Georgia" panose="02040502050405020303" pitchFamily="18" charset="0"/>
-              </a:rPr>
-              <a:t>etc</a:t>
-            </a:r>
-            <a:endParaRPr lang="en-US" dirty="0">
-              <a:latin typeface="Georgia" panose="02040502050405020303" pitchFamily="18" charset="0"/>
-            </a:endParaRPr>
-          </a:p>
-          <a:p>
-            <a:pPr lvl="1"/>
-            <a:r>
-              <a:rPr lang="en-US" dirty="0">
-                <a:latin typeface="Georgia" panose="02040502050405020303" pitchFamily="18" charset="0"/>
-              </a:rPr>
-              <a:t>	 → </a:t>
-            </a:r>
-            <a:r>
-              <a:rPr lang="en-US" dirty="0" err="1">
-                <a:latin typeface="Georgia" panose="02040502050405020303" pitchFamily="18" charset="0"/>
-              </a:rPr>
-              <a:t>Positie</a:t>
-            </a:r>
-            <a:r>
-              <a:rPr lang="en-US" dirty="0">
-                <a:latin typeface="Georgia" panose="02040502050405020303" pitchFamily="18" charset="0"/>
-              </a:rPr>
-              <a:t> van </a:t>
-            </a:r>
-            <a:r>
-              <a:rPr lang="en-US" dirty="0" err="1">
-                <a:latin typeface="Georgia" panose="02040502050405020303" pitchFamily="18" charset="0"/>
-              </a:rPr>
-              <a:t>sensoren</a:t>
-            </a:r>
-            <a:r>
-              <a:rPr lang="en-US" dirty="0">
-                <a:latin typeface="Georgia" panose="02040502050405020303" pitchFamily="18" charset="0"/>
-              </a:rPr>
-              <a:t> </a:t>
-            </a:r>
-            <a:r>
-              <a:rPr lang="en-US" dirty="0" err="1">
-                <a:latin typeface="Georgia" panose="02040502050405020303" pitchFamily="18" charset="0"/>
-              </a:rPr>
-              <a:t>opdelen</a:t>
-            </a:r>
-            <a:r>
-              <a:rPr lang="en-US" dirty="0">
-                <a:latin typeface="Georgia" panose="02040502050405020303" pitchFamily="18" charset="0"/>
-              </a:rPr>
-              <a:t> in X-, Y- </a:t>
-            </a:r>
-            <a:r>
-              <a:rPr lang="en-US" dirty="0" err="1">
-                <a:latin typeface="Georgia" panose="02040502050405020303" pitchFamily="18" charset="0"/>
-              </a:rPr>
-              <a:t>en</a:t>
-            </a:r>
-            <a:r>
-              <a:rPr lang="en-US" dirty="0">
-                <a:latin typeface="Georgia" panose="02040502050405020303" pitchFamily="18" charset="0"/>
-              </a:rPr>
-              <a:t> Z-as</a:t>
+              <a:t>, etc.</a:t>
             </a:r>
           </a:p>
           <a:p>
@@ -4153,10 +4087,97 @@
               <a:buChar char="•"/>
             </a:pPr>
             <a:r>
+              <a:rPr lang="en-US" dirty="0" err="1">
+                <a:latin typeface="Georgia" panose="02040502050405020303" pitchFamily="18" charset="0"/>
+              </a:rPr>
+              <a:t>Positie</a:t>
+            </a:r>
+            <a:r>
+              <a:rPr lang="en-US" dirty="0">
+                <a:latin typeface="Georgia" panose="02040502050405020303" pitchFamily="18" charset="0"/>
+              </a:rPr>
+              <a:t> van </a:t>
+            </a:r>
+            <a:r>
+              <a:rPr lang="en-US" dirty="0" err="1">
+                <a:latin typeface="Georgia" panose="02040502050405020303" pitchFamily="18" charset="0"/>
+              </a:rPr>
+              <a:t>sensoren</a:t>
+            </a:r>
+            <a:r>
+              <a:rPr lang="en-US" dirty="0">
+                <a:latin typeface="Georgia" panose="02040502050405020303" pitchFamily="18" charset="0"/>
+              </a:rPr>
+              <a:t> </a:t>
+            </a:r>
+            <a:r>
+              <a:rPr lang="en-US" dirty="0" err="1">
+                <a:latin typeface="Georgia" panose="02040502050405020303" pitchFamily="18" charset="0"/>
+              </a:rPr>
+              <a:t>opdelen</a:t>
+            </a:r>
+            <a:r>
+              <a:rPr lang="en-US" dirty="0">
+                <a:latin typeface="Georgia" panose="02040502050405020303" pitchFamily="18" charset="0"/>
+              </a:rPr>
+              <a:t> in X-, Y- </a:t>
+            </a:r>
+            <a:r>
+              <a:rPr lang="en-US" dirty="0" err="1">
+                <a:latin typeface="Georgia" panose="02040502050405020303" pitchFamily="18" charset="0"/>
+              </a:rPr>
+              <a:t>en</a:t>
+            </a:r>
+            <a:r>
+              <a:rPr lang="en-US" dirty="0">
+                <a:latin typeface="Georgia" panose="02040502050405020303" pitchFamily="18" charset="0"/>
+              </a:rPr>
+              <a:t> Z-as</a:t>
+            </a:r>
+          </a:p>
+          <a:p>
+            <a:pPr marL="742950" lvl="1" indent="-285750">
+              <a:buFont typeface="Arial" panose="020B0604020202020204" pitchFamily="34" charset="0"/>
+              <a:buChar char="•"/>
+            </a:pPr>
+            <a:endParaRPr lang="en-US" dirty="0">
+              <a:latin typeface="Georgia" panose="02040502050405020303" pitchFamily="18" charset="0"/>
+            </a:endParaRPr>
+          </a:p>
+          <a:p>
+            <a:pPr marL="742950" lvl="1" indent="-285750">
+              <a:buFont typeface="Arial" panose="020B0604020202020204" pitchFamily="34" charset="0"/>
+              <a:buChar char="•"/>
+            </a:pPr>
+            <a:r>
               <a:rPr lang="en-US" b="1" dirty="0" err="1">
                 <a:latin typeface="Georgia" panose="02040502050405020303" pitchFamily="18" charset="0"/>
               </a:rPr>
               <a:t>Tijdsreeksen</a:t>
+            </a:r>
+            <a:r>
+              <a:rPr lang="en-US" b="1" dirty="0">
+                <a:latin typeface="Georgia" panose="02040502050405020303" pitchFamily="18" charset="0"/>
+              </a:rPr>
+              <a:t> </a:t>
+            </a:r>
+            <a:r>
+              <a:rPr lang="en-US" dirty="0" err="1">
+                <a:latin typeface="Georgia" panose="02040502050405020303" pitchFamily="18" charset="0"/>
+              </a:rPr>
+              <a:t>als</a:t>
+            </a:r>
+            <a:r>
+              <a:rPr lang="en-US" dirty="0">
+                <a:latin typeface="Georgia" panose="02040502050405020303" pitchFamily="18" charset="0"/>
+              </a:rPr>
+              <a:t> </a:t>
+            </a:r>
+            <a:r>
+              <a:rPr lang="en-US" dirty="0" err="1">
+                <a:latin typeface="Georgia" panose="02040502050405020303" pitchFamily="18" charset="0"/>
+              </a:rPr>
+              <a:t>datapunten</a:t>
             </a:r>
             <a:r>
               <a:rPr lang="en-US" dirty="0">
@@ -4306,7 +4327,7 @@
         </p:nvSpPr>
         <p:spPr>
           <a:xfrm>
-            <a:off x="1119433" y="7293741"/>
+            <a:off x="1129617" y="7567141"/>
             <a:ext cx="9267409" cy="2677656"/>
           </a:xfrm>
           <a:prstGeom prst="rect">
@@ -4448,17 +4469,10 @@
             <a:endParaRPr lang="en-US" dirty="0"/>
           </a:p>
           <a:p>
-            <a:pPr lvl="2"/>
-            <a:r>
-              <a:rPr lang="en-US" dirty="0"/>
-              <a:t>	</a:t>
-            </a:r>
-            <a:r>
-              <a:rPr lang="en-US" dirty="0">
-                <a:latin typeface="Georgia" panose="02040502050405020303" pitchFamily="18" charset="0"/>
-              </a:rPr>
-              <a:t> → </a:t>
-            </a:r>
+            <a:pPr marL="1200150" lvl="2" indent="-285750">
+              <a:buFont typeface="Arial" panose="020B0604020202020204" pitchFamily="34" charset="0"/>
+              <a:buChar char="•"/>
+            </a:pPr>
             <a:r>
               <a:rPr lang="en-US" dirty="0"/>
               <a:t>O(n</a:t>
@@ -4995,11 +5009,14 @@
               <a:buChar char="•"/>
             </a:pPr>
             <a:r>
-              <a:rPr lang="en-US" dirty="0">
-                <a:latin typeface="Georgia" panose="02040502050405020303" pitchFamily="18" charset="0"/>
-              </a:rPr>
-              <a:t>Dure termen</a:t>
-            </a:r>
+              <a:rPr lang="en-US" dirty="0" err="1">
+                <a:latin typeface="Georgia" panose="02040502050405020303" pitchFamily="18" charset="0"/>
+              </a:rPr>
+              <a:t>Kostelijk</a:t>
+            </a:r>
+            <a:endParaRPr lang="en-US" dirty="0">
+              <a:latin typeface="Georgia" panose="02040502050405020303" pitchFamily="18" charset="0"/>
+            </a:endParaRPr>
           </a:p>
           <a:p>
             <a:endParaRPr lang="en-US" dirty="0">
@@ -5061,19 +5078,19 @@
               <a:rPr lang="en-US" dirty="0" err="1">
                 <a:latin typeface="Georgia" panose="02040502050405020303" pitchFamily="18" charset="0"/>
               </a:rPr>
-              <a:t>Goedkope</a:t>
+              <a:t>Hogere</a:t>
             </a:r>
             <a:r>
               <a:rPr lang="en-US" dirty="0">
                 <a:latin typeface="Georgia" panose="02040502050405020303" pitchFamily="18" charset="0"/>
               </a:rPr>
-              <a:t> termen maar minder </a:t>
+              <a:t> </a:t>
             </a:r>
             <a:r>
               <a:rPr lang="en-US" dirty="0" err="1">
                 <a:latin typeface="Georgia" panose="02040502050405020303" pitchFamily="18" charset="0"/>
               </a:rPr>
-              <a:t>nauwkeurig</a:t>
+              <a:t>relatieve</a:t>
             </a:r>
             <a:r>
               <a:rPr lang="en-US" dirty="0">
@@ -5085,38 +5102,11 @@
               <a:rPr lang="en-US" dirty="0" err="1">
                 <a:latin typeface="Georgia" panose="02040502050405020303" pitchFamily="18" charset="0"/>
               </a:rPr>
-              <a:t>bij</a:t>
-            </a:r>
-            <a:r>
-              <a:rPr lang="en-US" dirty="0">
-                <a:latin typeface="Georgia" panose="02040502050405020303" pitchFamily="18" charset="0"/>
-              </a:rPr>
-              <a:t> </a:t>
-            </a:r>
-            <a:r>
-              <a:rPr lang="en-US" dirty="0" err="1">
-                <a:latin typeface="Georgia" panose="02040502050405020303" pitchFamily="18" charset="0"/>
-              </a:rPr>
-              <a:t>eenzelfde</a:t>
-            </a:r>
-            <a:r>
-              <a:rPr lang="en-US" dirty="0">
-                <a:latin typeface="Georgia" panose="02040502050405020303" pitchFamily="18" charset="0"/>
-              </a:rPr>
-              <a:t> </a:t>
-            </a:r>
-            <a:r>
-              <a:rPr lang="en-US" dirty="0" err="1">
-                <a:latin typeface="Georgia" panose="02040502050405020303" pitchFamily="18" charset="0"/>
-              </a:rPr>
-              <a:t>aantal</a:t>
-            </a:r>
-            <a:r>
-              <a:rPr lang="en-US" dirty="0">
-                <a:latin typeface="Georgia" panose="02040502050405020303" pitchFamily="18" charset="0"/>
-              </a:rPr>
-              <a:t> termen</a:t>
-            </a:r>
+              <a:t>fout</a:t>
+            </a:r>
+            <a:endParaRPr lang="en-US" dirty="0">
+              <a:latin typeface="Georgia" panose="02040502050405020303" pitchFamily="18" charset="0"/>
+            </a:endParaRPr>
           </a:p>
         </p:txBody>
       </p:sp>
@@ -5190,7 +5180,7 @@
         </p:blipFill>
         <p:spPr>
           <a:xfrm>
-            <a:off x="13024934" y="6464149"/>
+            <a:off x="13025093" y="6414662"/>
             <a:ext cx="6737272" cy="1273509"/>
           </a:xfrm>
           <a:prstGeom prst="rect">
@@ -5885,8 +5875,8 @@
         </p:nvSpPr>
         <p:spPr>
           <a:xfrm>
-            <a:off x="20376091" y="11796380"/>
-            <a:ext cx="9521908" cy="707886"/>
+            <a:off x="20372738" y="11955346"/>
+            <a:ext cx="9581482" cy="707886"/>
           </a:xfrm>
           <a:prstGeom prst="rect">
             <a:avLst/>
@@ -6288,54 +6278,57 @@
             </a:endParaRPr>
           </a:p>
           <a:p>
-            <a:pPr lvl="1"/>
-            <a:r>
-              <a:rPr lang="en-US" dirty="0" err="1">
-                <a:latin typeface="Georgia" panose="02040502050405020303" pitchFamily="18" charset="0"/>
-              </a:rPr>
-              <a:t>Inspiratie</a:t>
-            </a:r>
-            <a:r>
-              <a:rPr lang="en-US" dirty="0">
-                <a:latin typeface="Georgia" panose="02040502050405020303" pitchFamily="18" charset="0"/>
-              </a:rPr>
-              <a:t> </a:t>
-            </a:r>
-            <a:r>
-              <a:rPr lang="en-US" dirty="0" err="1">
-                <a:latin typeface="Georgia" panose="02040502050405020303" pitchFamily="18" charset="0"/>
-              </a:rPr>
-              <a:t>halen</a:t>
-            </a:r>
-            <a:r>
-              <a:rPr lang="en-US" dirty="0">
-                <a:latin typeface="Georgia" panose="02040502050405020303" pitchFamily="18" charset="0"/>
-              </a:rPr>
-              <a:t> </a:t>
-            </a:r>
-            <a:r>
-              <a:rPr lang="en-US" dirty="0" err="1">
-                <a:latin typeface="Georgia" panose="02040502050405020303" pitchFamily="18" charset="0"/>
-              </a:rPr>
-              <a:t>bij</a:t>
-            </a:r>
-            <a:r>
-              <a:rPr lang="en-US" dirty="0">
-                <a:latin typeface="Georgia" panose="02040502050405020303" pitchFamily="18" charset="0"/>
-              </a:rPr>
-              <a:t> matrix ACA-T:</a:t>
-            </a:r>
-          </a:p>
-          <a:p>
             <a:pPr marL="742950" lvl="1" indent="-285750">
               <a:buFont typeface="Arial" panose="020B0604020202020204" pitchFamily="34" charset="0"/>
               <a:buChar char="•"/>
             </a:pPr>
             <a:r>
+              <a:rPr lang="en-US" dirty="0" err="1">
+                <a:latin typeface="Georgia" panose="02040502050405020303" pitchFamily="18" charset="0"/>
+              </a:rPr>
+              <a:t>Inspiratie</a:t>
+            </a:r>
+            <a:r>
               <a:rPr lang="en-US" dirty="0">
                 <a:latin typeface="Georgia" panose="02040502050405020303" pitchFamily="18" charset="0"/>
               </a:rPr>
-              <a:t>Matrix-slices in termen </a:t>
+              <a:t> </a:t>
+            </a:r>
+            <a:r>
+              <a:rPr lang="en-US" dirty="0" err="1">
+                <a:latin typeface="Georgia" panose="02040502050405020303" pitchFamily="18" charset="0"/>
+              </a:rPr>
+              <a:t>halen</a:t>
+            </a:r>
+            <a:r>
+              <a:rPr lang="en-US" dirty="0">
+                <a:latin typeface="Georgia" panose="02040502050405020303" pitchFamily="18" charset="0"/>
+              </a:rPr>
+              <a:t> </a:t>
+            </a:r>
+            <a:r>
+              <a:rPr lang="en-US" dirty="0" err="1">
+                <a:latin typeface="Georgia" panose="02040502050405020303" pitchFamily="18" charset="0"/>
+              </a:rPr>
+              <a:t>bij</a:t>
+            </a:r>
+            <a:r>
+              <a:rPr lang="en-US" dirty="0">
+                <a:latin typeface="Georgia" panose="02040502050405020303" pitchFamily="18" charset="0"/>
+              </a:rPr>
+              <a:t> matrix ACA-T: </a:t>
+            </a:r>
+          </a:p>
+          <a:p>
+            <a:pPr marL="742950" lvl="1" indent="-285750">
+              <a:buFont typeface="Arial" panose="020B0604020202020204" pitchFamily="34" charset="0"/>
+              <a:buChar char="•"/>
+            </a:pPr>
+            <a:r>
+              <a:rPr lang="en-US" dirty="0">
+                <a:latin typeface="Georgia" panose="02040502050405020303" pitchFamily="18" charset="0"/>
+              </a:rPr>
+              <a:t>Matrix-slices </a:t>
             </a:r>
             <a:r>
               <a:rPr lang="en-US" dirty="0" err="1">
@@ -6512,7 +6505,7 @@
               <a:rPr lang="en-US" dirty="0" err="1">
                 <a:latin typeface="Georgia" panose="02040502050405020303" pitchFamily="18" charset="0"/>
               </a:rPr>
-              <a:t>bevat</a:t>
+              <a:t>bestaat</a:t>
             </a:r>
             <a:r>
               <a:rPr lang="en-US" dirty="0">
@@ -6524,7 +6517,7 @@
               <a:rPr lang="en-US" dirty="0" err="1">
                 <a:latin typeface="Georgia" panose="02040502050405020303" pitchFamily="18" charset="0"/>
               </a:rPr>
-              <a:t>een</a:t>
+              <a:t>uit</a:t>
             </a:r>
             <a:r>
               <a:rPr lang="en-US" dirty="0">
@@ -7908,7 +7901,7 @@
         </p:nvSpPr>
         <p:spPr>
           <a:xfrm>
-            <a:off x="20158821" y="19796700"/>
+            <a:off x="20155468" y="19908824"/>
             <a:ext cx="10010767" cy="523220"/>
           </a:xfrm>
           <a:prstGeom prst="rect">
@@ -8158,7 +8151,7 @@
         </p:nvSpPr>
         <p:spPr>
           <a:xfrm>
-            <a:off x="20342722" y="15251171"/>
+            <a:off x="20339369" y="15363295"/>
             <a:ext cx="9320330" cy="523220"/>
           </a:xfrm>
           <a:prstGeom prst="rect">
@@ -8216,7 +8209,7 @@
         </p:blipFill>
         <p:spPr>
           <a:xfrm>
-            <a:off x="22531544" y="12431902"/>
+            <a:off x="22528191" y="12544026"/>
             <a:ext cx="2316509" cy="2823992"/>
           </a:xfrm>
           <a:prstGeom prst="rect">
@@ -8246,7 +8239,7 @@
         </p:blipFill>
         <p:spPr>
           <a:xfrm>
-            <a:off x="25500357" y="12449199"/>
+            <a:off x="25497004" y="12561323"/>
             <a:ext cx="2247528" cy="2781407"/>
           </a:xfrm>
           <a:prstGeom prst="rect">
@@ -8268,8 +8261,8 @@
         </p:nvSpPr>
         <p:spPr>
           <a:xfrm>
-            <a:off x="20763472" y="5845638"/>
-            <a:ext cx="9190748" cy="954107"/>
+            <a:off x="20617932" y="5845638"/>
+            <a:ext cx="9336288" cy="954107"/>
           </a:xfrm>
           <a:prstGeom prst="rect">
             <a:avLst/>
@@ -8389,12 +8382,60 @@
               <a:rPr lang="en-US" sz="1400" dirty="0">
                 <a:latin typeface="Georgia" panose="02040502050405020303" pitchFamily="18" charset="0"/>
               </a:rPr>
-              <a:t> per rang. De bar is het </a:t>
+              <a:t> </a:t>
             </a:r>
             <a:r>
               <a:rPr lang="en-US" sz="1400" dirty="0" err="1">
                 <a:latin typeface="Georgia" panose="02040502050405020303" pitchFamily="18" charset="0"/>
               </a:rPr>
+              <a:t>voor</a:t>
+            </a:r>
+            <a:r>
+              <a:rPr lang="en-US" sz="1400" dirty="0">
+                <a:latin typeface="Georgia" panose="02040502050405020303" pitchFamily="18" charset="0"/>
+              </a:rPr>
+              <a:t> </a:t>
+            </a:r>
+            <a:r>
+              <a:rPr lang="en-US" sz="1400" dirty="0" err="1">
+                <a:latin typeface="Georgia" panose="02040502050405020303" pitchFamily="18" charset="0"/>
+              </a:rPr>
+              <a:t>verschillende</a:t>
+            </a:r>
+            <a:r>
+              <a:rPr lang="en-US" sz="1400" dirty="0">
+                <a:latin typeface="Georgia" panose="02040502050405020303" pitchFamily="18" charset="0"/>
+              </a:rPr>
+              <a:t> </a:t>
+            </a:r>
+            <a:r>
+              <a:rPr lang="en-US" sz="1400" dirty="0" err="1">
+                <a:latin typeface="Georgia" panose="02040502050405020303" pitchFamily="18" charset="0"/>
+              </a:rPr>
+              <a:t>decompositie</a:t>
+            </a:r>
+            <a:r>
+              <a:rPr lang="en-US" sz="1400" dirty="0">
+                <a:latin typeface="Georgia" panose="02040502050405020303" pitchFamily="18" charset="0"/>
+              </a:rPr>
+              <a:t> </a:t>
+            </a:r>
+            <a:r>
+              <a:rPr lang="en-US" sz="1400" dirty="0" err="1">
+                <a:latin typeface="Georgia" panose="02040502050405020303" pitchFamily="18" charset="0"/>
+              </a:rPr>
+              <a:t>groottes</a:t>
+            </a:r>
+            <a:r>
+              <a:rPr lang="en-US" sz="1400" dirty="0">
+                <a:latin typeface="Georgia" panose="02040502050405020303" pitchFamily="18" charset="0"/>
+              </a:rPr>
+              <a:t>. De balk is het </a:t>
+            </a:r>
+            <a:r>
+              <a:rPr lang="en-US" sz="1400" dirty="0" err="1">
+                <a:latin typeface="Georgia" panose="02040502050405020303" pitchFamily="18" charset="0"/>
+              </a:rPr>
               <a:t>gemiddelde</a:t>
             </a:r>
             <a:r>
@@ -8461,37 +8502,55 @@
               <a:rPr lang="en-US" sz="1400" dirty="0">
                 <a:latin typeface="Georgia" panose="02040502050405020303" pitchFamily="18" charset="0"/>
               </a:rPr>
-              <a:t> (n = 50). De rang van </a:t>
+              <a:t> (n = 50). </a:t>
+            </a:r>
+            <a:r>
+              <a:rPr lang="en-US" sz="1400" b="1" dirty="0" err="1">
+                <a:latin typeface="Georgia" panose="02040502050405020303" pitchFamily="18" charset="0"/>
+              </a:rPr>
+              <a:t>Opmerkelijk</a:t>
+            </a:r>
+            <a:r>
+              <a:rPr lang="en-US" sz="1400" b="1" dirty="0">
+                <a:latin typeface="Georgia" panose="02040502050405020303" pitchFamily="18" charset="0"/>
+              </a:rPr>
+              <a:t>:</a:t>
+            </a:r>
+            <a:r>
+              <a:rPr lang="en-US" sz="1400" dirty="0">
+                <a:latin typeface="Georgia" panose="02040502050405020303" pitchFamily="18" charset="0"/>
+              </a:rPr>
+              <a:t> </a:t>
             </a:r>
             <a:r>
               <a:rPr lang="en-US" sz="1400" dirty="0" err="1">
                 <a:latin typeface="Georgia" panose="02040502050405020303" pitchFamily="18" charset="0"/>
               </a:rPr>
-              <a:t>een</a:t>
+              <a:t>Hogere</a:t>
             </a:r>
             <a:r>
               <a:rPr lang="en-US" sz="1400" dirty="0">
                 <a:latin typeface="Georgia" panose="02040502050405020303" pitchFamily="18" charset="0"/>
               </a:rPr>
-              <a:t> </a:t>
+              <a:t> types </a:t>
             </a:r>
             <a:r>
               <a:rPr lang="en-US" sz="1400" dirty="0" err="1">
                 <a:latin typeface="Georgia" panose="02040502050405020303" pitchFamily="18" charset="0"/>
               </a:rPr>
-              <a:t>decompositie</a:t>
+              <a:t>liggen</a:t>
             </a:r>
             <a:r>
               <a:rPr lang="en-US" sz="1400" dirty="0">
                 <a:latin typeface="Georgia" panose="02040502050405020303" pitchFamily="18" charset="0"/>
               </a:rPr>
-              <a:t> is </a:t>
+              <a:t> </a:t>
             </a:r>
             <a:r>
               <a:rPr lang="en-US" sz="1400" dirty="0" err="1">
                 <a:latin typeface="Georgia" panose="02040502050405020303" pitchFamily="18" charset="0"/>
               </a:rPr>
-              <a:t>gelijk</a:t>
+              <a:t>dichter</a:t>
             </a:r>
             <a:r>
               <a:rPr lang="en-US" sz="1400" dirty="0">
@@ -8503,73 +8562,7 @@
               <a:rPr lang="en-US" sz="1400" dirty="0" err="1">
                 <a:latin typeface="Georgia" panose="02040502050405020303" pitchFamily="18" charset="0"/>
               </a:rPr>
-              <a:t>aan</a:t>
-            </a:r>
-            <a:r>
-              <a:rPr lang="en-US" sz="1400" dirty="0">
-                <a:latin typeface="Georgia" panose="02040502050405020303" pitchFamily="18" charset="0"/>
-              </a:rPr>
-              <a:t> het </a:t>
-            </a:r>
-            <a:r>
-              <a:rPr lang="en-US" sz="1400" dirty="0" err="1">
-                <a:latin typeface="Georgia" panose="02040502050405020303" pitchFamily="18" charset="0"/>
-              </a:rPr>
-              <a:t>aantal</a:t>
-            </a:r>
-            <a:r>
-              <a:rPr lang="en-US" sz="1400" dirty="0">
-                <a:latin typeface="Georgia" panose="02040502050405020303" pitchFamily="18" charset="0"/>
-              </a:rPr>
-              <a:t> termen. </a:t>
-            </a:r>
-            <a:r>
-              <a:rPr lang="en-US" sz="1400" b="1" dirty="0" err="1">
-                <a:latin typeface="Georgia" panose="02040502050405020303" pitchFamily="18" charset="0"/>
-              </a:rPr>
-              <a:t>Opmerkelijk</a:t>
-            </a:r>
-            <a:r>
-              <a:rPr lang="en-US" sz="1400" b="1" dirty="0">
-                <a:latin typeface="Georgia" panose="02040502050405020303" pitchFamily="18" charset="0"/>
-              </a:rPr>
-              <a:t>:</a:t>
-            </a:r>
-            <a:r>
-              <a:rPr lang="en-US" sz="1400" dirty="0">
-                <a:latin typeface="Georgia" panose="02040502050405020303" pitchFamily="18" charset="0"/>
-              </a:rPr>
-              <a:t> </a:t>
-            </a:r>
-            <a:r>
-              <a:rPr lang="en-US" sz="1400" dirty="0" err="1">
-                <a:latin typeface="Georgia" panose="02040502050405020303" pitchFamily="18" charset="0"/>
-              </a:rPr>
-              <a:t>Hogere</a:t>
-            </a:r>
-            <a:r>
-              <a:rPr lang="en-US" sz="1400" dirty="0">
-                <a:latin typeface="Georgia" panose="02040502050405020303" pitchFamily="18" charset="0"/>
-              </a:rPr>
-              <a:t> types </a:t>
-            </a:r>
-            <a:r>
-              <a:rPr lang="en-US" sz="1400" dirty="0" err="1">
-                <a:latin typeface="Georgia" panose="02040502050405020303" pitchFamily="18" charset="0"/>
-              </a:rPr>
-              <a:t>liggen</a:t>
-            </a:r>
-            <a:r>
-              <a:rPr lang="en-US" sz="1400" dirty="0">
-                <a:latin typeface="Georgia" panose="02040502050405020303" pitchFamily="18" charset="0"/>
-              </a:rPr>
-              <a:t> </a:t>
-            </a:r>
-            <a:r>
-              <a:rPr lang="en-US" sz="1400" dirty="0" err="1">
-                <a:latin typeface="Georgia" panose="02040502050405020303" pitchFamily="18" charset="0"/>
-              </a:rPr>
-              <a:t>dichter</a:t>
+              <a:t>bij</a:t>
             </a:r>
             <a:r>
               <a:rPr lang="en-US" sz="1400" dirty="0">
@@ -8868,7 +8861,7 @@
               <a:rPr lang="en-US" sz="1400" dirty="0">
                 <a:latin typeface="Georgia" panose="02040502050405020303" pitchFamily="18" charset="0"/>
               </a:rPr>
-              <a:t>)</a:t>
+              <a:t>).</a:t>
             </a:r>
           </a:p>
           <a:p>
@@ -9051,10 +9044,16 @@
               <a:buChar char="•"/>
             </a:pPr>
             <a:r>
+              <a:rPr lang="en-US" sz="1400" dirty="0">
+                <a:latin typeface="Georgia" panose="02040502050405020303" pitchFamily="18" charset="0"/>
+              </a:rPr>
+              <a:t>We </a:t>
+            </a:r>
+            <a:r>
               <a:rPr lang="en-US" sz="1400" dirty="0" err="1">
                 <a:latin typeface="Georgia" panose="02040502050405020303" pitchFamily="18" charset="0"/>
               </a:rPr>
-              <a:t>Een</a:t>
+              <a:t>willen</a:t>
             </a:r>
             <a:r>
               <a:rPr lang="en-US" sz="1400" dirty="0">
@@ -9066,6 +9065,18 @@
               <a:rPr lang="en-US" sz="1400" dirty="0" err="1">
                 <a:latin typeface="Georgia" panose="02040502050405020303" pitchFamily="18" charset="0"/>
               </a:rPr>
+              <a:t>een</a:t>
+            </a:r>
+            <a:r>
+              <a:rPr lang="en-US" sz="1400" dirty="0">
+                <a:latin typeface="Georgia" panose="02040502050405020303" pitchFamily="18" charset="0"/>
+              </a:rPr>
+              <a:t> </a:t>
+            </a:r>
+            <a:r>
+              <a:rPr lang="en-US" sz="1400" dirty="0" err="1">
+                <a:latin typeface="Georgia" panose="02040502050405020303" pitchFamily="18" charset="0"/>
+              </a:rPr>
               <a:t>methode</a:t>
             </a:r>
             <a:r>
@@ -9084,13 +9095,13 @@
               <a:rPr lang="en-US" sz="1400" dirty="0">
                 <a:latin typeface="Georgia" panose="02040502050405020303" pitchFamily="18" charset="0"/>
               </a:rPr>
-              <a:t> is </a:t>
+              <a:t> wat </a:t>
             </a:r>
             <a:r>
               <a:rPr lang="en-US" sz="1400" dirty="0" err="1">
                 <a:latin typeface="Georgia" panose="02040502050405020303" pitchFamily="18" charset="0"/>
               </a:rPr>
-              <a:t>theoretisch</a:t>
+              <a:t>een</a:t>
             </a:r>
             <a:r>
               <a:rPr lang="en-US" sz="1400" dirty="0">
@@ -9102,19 +9113,19 @@
               <a:rPr lang="en-US" sz="1400" dirty="0" err="1">
                 <a:latin typeface="Georgia" panose="02040502050405020303" pitchFamily="18" charset="0"/>
               </a:rPr>
-              <a:t>ideaal</a:t>
+              <a:t>goede</a:t>
             </a:r>
             <a:r>
               <a:rPr lang="en-US" sz="1400" dirty="0">
                 <a:latin typeface="Georgia" panose="02040502050405020303" pitchFamily="18" charset="0"/>
               </a:rPr>
-              <a:t>: </a:t>
+              <a:t> </a:t>
             </a:r>
             <a:r>
               <a:rPr lang="en-US" sz="1400" dirty="0" err="1">
                 <a:latin typeface="Georgia" panose="02040502050405020303" pitchFamily="18" charset="0"/>
               </a:rPr>
-              <a:t>goede</a:t>
+              <a:t>balans</a:t>
             </a:r>
             <a:r>
               <a:rPr lang="en-US" sz="1400" dirty="0">
@@ -9126,7 +9137,7 @@
               <a:rPr lang="en-US" sz="1400" dirty="0" err="1">
                 <a:latin typeface="Georgia" panose="02040502050405020303" pitchFamily="18" charset="0"/>
               </a:rPr>
-              <a:t>balans</a:t>
+              <a:t>tussen</a:t>
             </a:r>
             <a:r>
               <a:rPr lang="en-US" sz="1400" dirty="0">
@@ -9138,7 +9149,7 @@
               <a:rPr lang="en-US" sz="1400" dirty="0" err="1">
                 <a:latin typeface="Georgia" panose="02040502050405020303" pitchFamily="18" charset="0"/>
               </a:rPr>
-              <a:t>tussen</a:t>
+              <a:t>rekentijd</a:t>
             </a:r>
             <a:r>
               <a:rPr lang="en-US" sz="1400" dirty="0">
@@ -9150,7 +9161,7 @@
               <a:rPr lang="en-US" sz="1400" dirty="0" err="1">
                 <a:latin typeface="Georgia" panose="02040502050405020303" pitchFamily="18" charset="0"/>
               </a:rPr>
-              <a:t>rekentijd</a:t>
+              <a:t>en</a:t>
             </a:r>
             <a:r>
               <a:rPr lang="en-US" sz="1400" dirty="0">
@@ -9162,7 +9173,7 @@
               <a:rPr lang="en-US" sz="1400" dirty="0" err="1">
                 <a:latin typeface="Georgia" panose="02040502050405020303" pitchFamily="18" charset="0"/>
               </a:rPr>
-              <a:t>en</a:t>
+              <a:t>nauwkeurigheid</a:t>
             </a:r>
             <a:r>
               <a:rPr lang="en-US" sz="1400" dirty="0">
@@ -9174,11 +9185,14 @@
               <a:rPr lang="en-US" sz="1400" dirty="0" err="1">
                 <a:latin typeface="Georgia" panose="02040502050405020303" pitchFamily="18" charset="0"/>
               </a:rPr>
-              <a:t>nauwkeurigheid</a:t>
-            </a:r>
-            <a:endParaRPr lang="en-US" sz="1400" dirty="0">
-              <a:latin typeface="Georgia" panose="02040502050405020303" pitchFamily="18" charset="0"/>
-            </a:endParaRPr>
+              <a:t>aangeeft</a:t>
+            </a:r>
+            <a:r>
+              <a:rPr lang="en-US" sz="1400" dirty="0">
+                <a:latin typeface="Georgia" panose="02040502050405020303" pitchFamily="18" charset="0"/>
+              </a:rPr>
+              <a:t>.</a:t>
+            </a:r>
           </a:p>
         </p:txBody>
       </p:sp>
@@ -9199,7 +9213,7 @@
         </p:nvCxnSpPr>
         <p:spPr>
           <a:xfrm flipH="1">
-            <a:off x="7904463" y="6061027"/>
+            <a:off x="7898917" y="6313985"/>
             <a:ext cx="1038302" cy="228844"/>
           </a:xfrm>
           <a:prstGeom prst="straightConnector1">
@@ -9238,7 +9252,7 @@
         </p:nvSpPr>
         <p:spPr>
           <a:xfrm>
-            <a:off x="8942765" y="5845583"/>
+            <a:off x="8937219" y="6098541"/>
             <a:ext cx="1436717" cy="430887"/>
           </a:xfrm>
           <a:prstGeom prst="rect">
@@ -9320,7 +9334,7 @@
         </p:blipFill>
         <p:spPr>
           <a:xfrm>
-            <a:off x="854934" y="5144906"/>
+            <a:off x="849388" y="5397864"/>
             <a:ext cx="7691709" cy="2115951"/>
           </a:xfrm>
           <a:prstGeom prst="rect">
@@ -9440,10 +9454,10 @@
       </p:sp>
       <p:pic>
         <p:nvPicPr>
-          <p:cNvPr id="35" name="Graphic 34">
+          <p:cNvPr id="56" name="Graphic 55">
             <a:extLst>
               <a:ext uri="{FF2B5EF4-FFF2-40B4-BE49-F238E27FC236}">
-                <a16:creationId xmlns:a16="http://schemas.microsoft.com/office/drawing/2014/main" id="{BCEC2E74-B566-8F18-37CE-18E8293DD5AE}"/>
+                <a16:creationId xmlns:a16="http://schemas.microsoft.com/office/drawing/2014/main" id="{124AD95A-D127-DFD7-DB11-7B2524A13C18}"/>
               </a:ext>
             </a:extLst>
           </p:cNvPr>
@@ -9469,8 +9483,8 @@
         </p:blipFill>
         <p:spPr>
           <a:xfrm>
-            <a:off x="21007351" y="2583642"/>
-            <a:ext cx="8042857" cy="3261995"/>
+            <a:off x="25208583" y="16106002"/>
+            <a:ext cx="4803432" cy="3599680"/>
           </a:xfrm>
           <a:prstGeom prst="rect">
             <a:avLst/>
@@ -9479,10 +9493,10 @@
       </p:pic>
       <p:pic>
         <p:nvPicPr>
-          <p:cNvPr id="56" name="Graphic 55">
+          <p:cNvPr id="59" name="Graphic 58">
             <a:extLst>
               <a:ext uri="{FF2B5EF4-FFF2-40B4-BE49-F238E27FC236}">
-                <a16:creationId xmlns:a16="http://schemas.microsoft.com/office/drawing/2014/main" id="{124AD95A-D127-DFD7-DB11-7B2524A13C18}"/>
+                <a16:creationId xmlns:a16="http://schemas.microsoft.com/office/drawing/2014/main" id="{76F64728-E8C2-E5A4-052A-AD76A1078B22}"/>
               </a:ext>
             </a:extLst>
           </p:cNvPr>
@@ -9508,46 +9522,7 @@
         </p:blipFill>
         <p:spPr>
           <a:xfrm>
-            <a:off x="25211936" y="15993878"/>
-            <a:ext cx="4803432" cy="3599680"/>
-          </a:xfrm>
-          <a:prstGeom prst="rect">
-            <a:avLst/>
-          </a:prstGeom>
-        </p:spPr>
-      </p:pic>
-      <p:pic>
-        <p:nvPicPr>
-          <p:cNvPr id="59" name="Graphic 58">
-            <a:extLst>
-              <a:ext uri="{FF2B5EF4-FFF2-40B4-BE49-F238E27FC236}">
-                <a16:creationId xmlns:a16="http://schemas.microsoft.com/office/drawing/2014/main" id="{76F64728-E8C2-E5A4-052A-AD76A1078B22}"/>
-              </a:ext>
-            </a:extLst>
-          </p:cNvPr>
-          <p:cNvPicPr>
-            <a:picLocks noChangeAspect="1"/>
-          </p:cNvPicPr>
-          <p:nvPr/>
-        </p:nvPicPr>
-        <p:blipFill>
-          <a:blip r:embed="rId16">
-            <a:extLst>
-              <a:ext uri="{28A0092B-C50C-407E-A947-70E740481C1C}">
-                <a14:useLocalDpi xmlns:a14="http://schemas.microsoft.com/office/drawing/2010/main" val="0"/>
-              </a:ext>
-              <a:ext uri="{96DAC541-7B7A-43D3-8B79-37D633B846F1}">
-                <asvg:svgBlip xmlns:asvg="http://schemas.microsoft.com/office/drawing/2016/SVG/main" r:embed="rId17"/>
-              </a:ext>
-            </a:extLst>
-          </a:blip>
-          <a:stretch>
-            <a:fillRect/>
-          </a:stretch>
-        </p:blipFill>
-        <p:spPr>
-          <a:xfrm>
-            <a:off x="20303897" y="15993878"/>
+            <a:off x="20300544" y="16106002"/>
             <a:ext cx="4803431" cy="3599680"/>
           </a:xfrm>
           <a:prstGeom prst="rect">
@@ -9646,6 +9621,45 @@
           <p:nvPr/>
         </p:nvPicPr>
         <p:blipFill>
+          <a:blip r:embed="rId16">
+            <a:extLst>
+              <a:ext uri="{28A0092B-C50C-407E-A947-70E740481C1C}">
+                <a14:useLocalDpi xmlns:a14="http://schemas.microsoft.com/office/drawing/2010/main" val="0"/>
+              </a:ext>
+              <a:ext uri="{96DAC541-7B7A-43D3-8B79-37D633B846F1}">
+                <asvg:svgBlip xmlns:asvg="http://schemas.microsoft.com/office/drawing/2016/SVG/main" r:embed="rId17"/>
+              </a:ext>
+            </a:extLst>
+          </a:blip>
+          <a:stretch>
+            <a:fillRect/>
+          </a:stretch>
+        </p:blipFill>
+        <p:spPr>
+          <a:xfrm>
+            <a:off x="20227572" y="6936497"/>
+            <a:ext cx="6075067" cy="3544679"/>
+          </a:xfrm>
+          <a:prstGeom prst="rect">
+            <a:avLst/>
+          </a:prstGeom>
+        </p:spPr>
+      </p:pic>
+      <p:pic>
+        <p:nvPicPr>
+          <p:cNvPr id="36" name="Graphic 35">
+            <a:extLst>
+              <a:ext uri="{FF2B5EF4-FFF2-40B4-BE49-F238E27FC236}">
+                <a16:creationId xmlns:a16="http://schemas.microsoft.com/office/drawing/2014/main" id="{18C1DC16-456E-2C46-C27E-53F152966B3E}"/>
+              </a:ext>
+            </a:extLst>
+          </p:cNvPr>
+          <p:cNvPicPr>
+            <a:picLocks noChangeAspect="1"/>
+          </p:cNvPicPr>
+          <p:nvPr/>
+        </p:nvPicPr>
+        <p:blipFill>
           <a:blip r:embed="rId18">
             <a:extLst>
               <a:ext uri="{28A0092B-C50C-407E-A947-70E740481C1C}">
@@ -9662,8 +9676,8 @@
         </p:blipFill>
         <p:spPr>
           <a:xfrm>
-            <a:off x="20227572" y="6936497"/>
-            <a:ext cx="6075067" cy="3544679"/>
+            <a:off x="21012048" y="2604636"/>
+            <a:ext cx="8042857" cy="3221220"/>
           </a:xfrm>
           <a:prstGeom prst="rect">
             <a:avLst/>

</xml_diff>